<commit_message>
Zahlungen: neues Feld 'Zweck' angelegt
</commit_message>
<xml_diff>
--- a/Aufgaben.pptx
+++ b/Aufgaben.pptx
@@ -19959,7 +19959,7 @@
           <a:p>
             <a:fld id="{345961D2-DBF7-42AE-B789-18ADD99FC909}" type="datetimeFigureOut">
               <a:rPr lang="en-US" smtClean="0"/>
-              <a:t>9/13/2019</a:t>
+              <a:t>9/16/2019</a:t>
             </a:fld>
             <a:endParaRPr lang="en-US"/>
           </a:p>
@@ -20908,7 +20908,7 @@
           <a:p>
             <a:fld id="{03D2199C-AACF-4674-9026-68D71E5E2E3A}" type="datetimeFigureOut">
               <a:rPr lang="en-US" smtClean="0"/>
-              <a:t>9/13/2019</a:t>
+              <a:t>9/16/2019</a:t>
             </a:fld>
             <a:endParaRPr lang="en-US"/>
           </a:p>
@@ -21155,7 +21155,7 @@
           <a:p>
             <a:fld id="{03D2199C-AACF-4674-9026-68D71E5E2E3A}" type="datetimeFigureOut">
               <a:rPr lang="en-US" smtClean="0"/>
-              <a:t>9/13/2019</a:t>
+              <a:t>9/16/2019</a:t>
             </a:fld>
             <a:endParaRPr lang="en-US"/>
           </a:p>
@@ -21411,7 +21411,7 @@
           <a:p>
             <a:fld id="{03D2199C-AACF-4674-9026-68D71E5E2E3A}" type="datetimeFigureOut">
               <a:rPr lang="en-US" smtClean="0"/>
-              <a:t>9/13/2019</a:t>
+              <a:t>9/16/2019</a:t>
             </a:fld>
             <a:endParaRPr lang="en-US"/>
           </a:p>
@@ -21585,7 +21585,7 @@
           <a:p>
             <a:fld id="{03D2199C-AACF-4674-9026-68D71E5E2E3A}" type="datetimeFigureOut">
               <a:rPr lang="en-US" smtClean="0"/>
-              <a:t>9/13/2019</a:t>
+              <a:t>9/16/2019</a:t>
             </a:fld>
             <a:endParaRPr lang="en-US"/>
           </a:p>
@@ -21928,7 +21928,7 @@
           <a:p>
             <a:fld id="{03D2199C-AACF-4674-9026-68D71E5E2E3A}" type="datetimeFigureOut">
               <a:rPr lang="en-US" smtClean="0"/>
-              <a:t>9/13/2019</a:t>
+              <a:t>9/16/2019</a:t>
             </a:fld>
             <a:endParaRPr lang="en-US"/>
           </a:p>
@@ -22242,7 +22242,7 @@
           <a:p>
             <a:fld id="{03D2199C-AACF-4674-9026-68D71E5E2E3A}" type="datetimeFigureOut">
               <a:rPr lang="en-US" smtClean="0"/>
-              <a:t>9/13/2019</a:t>
+              <a:t>9/16/2019</a:t>
             </a:fld>
             <a:endParaRPr lang="en-US"/>
           </a:p>
@@ -22621,7 +22621,7 @@
           <a:p>
             <a:fld id="{03D2199C-AACF-4674-9026-68D71E5E2E3A}" type="datetimeFigureOut">
               <a:rPr lang="en-US" smtClean="0"/>
-              <a:t>9/13/2019</a:t>
+              <a:t>9/16/2019</a:t>
             </a:fld>
             <a:endParaRPr lang="en-US"/>
           </a:p>
@@ -22739,7 +22739,7 @@
           <a:p>
             <a:fld id="{03D2199C-AACF-4674-9026-68D71E5E2E3A}" type="datetimeFigureOut">
               <a:rPr lang="en-US" smtClean="0"/>
-              <a:t>9/13/2019</a:t>
+              <a:t>9/16/2019</a:t>
             </a:fld>
             <a:endParaRPr lang="en-US"/>
           </a:p>
@@ -22910,7 +22910,7 @@
           <a:p>
             <a:fld id="{03D2199C-AACF-4674-9026-68D71E5E2E3A}" type="datetimeFigureOut">
               <a:rPr lang="en-US" smtClean="0"/>
-              <a:t>9/13/2019</a:t>
+              <a:t>9/16/2019</a:t>
             </a:fld>
             <a:endParaRPr lang="en-US"/>
           </a:p>
@@ -23264,7 +23264,7 @@
           <a:p>
             <a:fld id="{03D2199C-AACF-4674-9026-68D71E5E2E3A}" type="datetimeFigureOut">
               <a:rPr lang="en-US" smtClean="0"/>
-              <a:t>9/13/2019</a:t>
+              <a:t>9/16/2019</a:t>
             </a:fld>
             <a:endParaRPr lang="en-US"/>
           </a:p>
@@ -23646,7 +23646,7 @@
           <a:p>
             <a:fld id="{03D2199C-AACF-4674-9026-68D71E5E2E3A}" type="datetimeFigureOut">
               <a:rPr lang="en-US" smtClean="0"/>
-              <a:t>9/13/2019</a:t>
+              <a:t>9/16/2019</a:t>
             </a:fld>
             <a:endParaRPr lang="en-US"/>
           </a:p>
@@ -23933,7 +23933,7 @@
           <a:p>
             <a:fld id="{03D2199C-AACF-4674-9026-68D71E5E2E3A}" type="datetimeFigureOut">
               <a:rPr lang="en-US" smtClean="0"/>
-              <a:t>9/13/2019</a:t>
+              <a:t>9/16/2019</a:t>
             </a:fld>
             <a:endParaRPr lang="en-US"/>
           </a:p>

</xml_diff>

<commit_message>
Konten anlegen aus der Weboberflaeche
</commit_message>
<xml_diff>
--- a/Aufgaben.pptx
+++ b/Aufgaben.pptx
@@ -5,7 +5,7 @@
     <p:sldMasterId id="2147483738" r:id="rId1"/>
   </p:sldMasterIdLst>
   <p:notesMasterIdLst>
-    <p:notesMasterId r:id="rId23"/>
+    <p:notesMasterId r:id="rId25"/>
   </p:notesMasterIdLst>
   <p:sldIdLst>
     <p:sldId id="256" r:id="rId2"/>
@@ -27,8 +27,10 @@
     <p:sldId id="276" r:id="rId18"/>
     <p:sldId id="264" r:id="rId19"/>
     <p:sldId id="277" r:id="rId20"/>
-    <p:sldId id="265" r:id="rId21"/>
-    <p:sldId id="266" r:id="rId22"/>
+    <p:sldId id="278" r:id="rId21"/>
+    <p:sldId id="279" r:id="rId22"/>
+    <p:sldId id="265" r:id="rId23"/>
+    <p:sldId id="266" r:id="rId24"/>
   </p:sldIdLst>
   <p:sldSz cx="12192000" cy="6858000"/>
   <p:notesSz cx="6858000" cy="9144000"/>
@@ -4630,6 +4632,753 @@
 </file>
 
 <file path=ppt/diagrams/colors7.xml><?xml version="1.0" encoding="utf-8"?>
+<dgm:colorsDef xmlns:dgm="http://schemas.openxmlformats.org/drawingml/2006/diagram" xmlns:a="http://schemas.openxmlformats.org/drawingml/2006/main" uniqueId="urn:microsoft.com/office/officeart/2005/8/colors/accent1_2">
+  <dgm:title val=""/>
+  <dgm:desc val=""/>
+  <dgm:catLst>
+    <dgm:cat type="accent1" pri="11200"/>
+  </dgm:catLst>
+  <dgm:styleLbl name="node0">
+    <dgm:fillClrLst meth="repeat">
+      <a:schemeClr val="accent1"/>
+    </dgm:fillClrLst>
+    <dgm:linClrLst meth="repeat">
+      <a:schemeClr val="lt1"/>
+    </dgm:linClrLst>
+    <dgm:effectClrLst/>
+    <dgm:txLinClrLst/>
+    <dgm:txFillClrLst/>
+    <dgm:txEffectClrLst/>
+  </dgm:styleLbl>
+  <dgm:styleLbl name="alignNode1">
+    <dgm:fillClrLst meth="repeat">
+      <a:schemeClr val="accent1"/>
+    </dgm:fillClrLst>
+    <dgm:linClrLst meth="repeat">
+      <a:schemeClr val="accent1"/>
+    </dgm:linClrLst>
+    <dgm:effectClrLst/>
+    <dgm:txLinClrLst/>
+    <dgm:txFillClrLst/>
+    <dgm:txEffectClrLst/>
+  </dgm:styleLbl>
+  <dgm:styleLbl name="node1">
+    <dgm:fillClrLst meth="repeat">
+      <a:schemeClr val="accent1"/>
+    </dgm:fillClrLst>
+    <dgm:linClrLst meth="repeat">
+      <a:schemeClr val="lt1"/>
+    </dgm:linClrLst>
+    <dgm:effectClrLst/>
+    <dgm:txLinClrLst/>
+    <dgm:txFillClrLst/>
+    <dgm:txEffectClrLst/>
+  </dgm:styleLbl>
+  <dgm:styleLbl name="lnNode1">
+    <dgm:fillClrLst meth="repeat">
+      <a:schemeClr val="accent1"/>
+    </dgm:fillClrLst>
+    <dgm:linClrLst meth="repeat">
+      <a:schemeClr val="lt1"/>
+    </dgm:linClrLst>
+    <dgm:effectClrLst/>
+    <dgm:txLinClrLst/>
+    <dgm:txFillClrLst/>
+    <dgm:txEffectClrLst/>
+  </dgm:styleLbl>
+  <dgm:styleLbl name="vennNode1">
+    <dgm:fillClrLst meth="repeat">
+      <a:schemeClr val="accent1">
+        <a:alpha val="50000"/>
+      </a:schemeClr>
+    </dgm:fillClrLst>
+    <dgm:linClrLst meth="repeat">
+      <a:schemeClr val="lt1"/>
+    </dgm:linClrLst>
+    <dgm:effectClrLst/>
+    <dgm:txLinClrLst/>
+    <dgm:txFillClrLst/>
+    <dgm:txEffectClrLst/>
+  </dgm:styleLbl>
+  <dgm:styleLbl name="node2">
+    <dgm:fillClrLst meth="repeat">
+      <a:schemeClr val="accent1"/>
+    </dgm:fillClrLst>
+    <dgm:linClrLst meth="repeat">
+      <a:schemeClr val="lt1"/>
+    </dgm:linClrLst>
+    <dgm:effectClrLst/>
+    <dgm:txLinClrLst/>
+    <dgm:txFillClrLst/>
+    <dgm:txEffectClrLst/>
+  </dgm:styleLbl>
+  <dgm:styleLbl name="node3">
+    <dgm:fillClrLst meth="repeat">
+      <a:schemeClr val="accent1"/>
+    </dgm:fillClrLst>
+    <dgm:linClrLst meth="repeat">
+      <a:schemeClr val="lt1"/>
+    </dgm:linClrLst>
+    <dgm:effectClrLst/>
+    <dgm:txLinClrLst/>
+    <dgm:txFillClrLst/>
+    <dgm:txEffectClrLst/>
+  </dgm:styleLbl>
+  <dgm:styleLbl name="node4">
+    <dgm:fillClrLst meth="repeat">
+      <a:schemeClr val="accent1"/>
+    </dgm:fillClrLst>
+    <dgm:linClrLst meth="repeat">
+      <a:schemeClr val="lt1"/>
+    </dgm:linClrLst>
+    <dgm:effectClrLst/>
+    <dgm:txLinClrLst/>
+    <dgm:txFillClrLst/>
+    <dgm:txEffectClrLst/>
+  </dgm:styleLbl>
+  <dgm:styleLbl name="fgImgPlace1">
+    <dgm:fillClrLst meth="repeat">
+      <a:schemeClr val="accent1">
+        <a:tint val="50000"/>
+      </a:schemeClr>
+    </dgm:fillClrLst>
+    <dgm:linClrLst meth="repeat">
+      <a:schemeClr val="lt1"/>
+    </dgm:linClrLst>
+    <dgm:effectClrLst/>
+    <dgm:txLinClrLst/>
+    <dgm:txFillClrLst meth="repeat">
+      <a:schemeClr val="lt1"/>
+    </dgm:txFillClrLst>
+    <dgm:txEffectClrLst/>
+  </dgm:styleLbl>
+  <dgm:styleLbl name="alignImgPlace1">
+    <dgm:fillClrLst meth="repeat">
+      <a:schemeClr val="accent1">
+        <a:tint val="50000"/>
+      </a:schemeClr>
+    </dgm:fillClrLst>
+    <dgm:linClrLst meth="repeat">
+      <a:schemeClr val="lt1"/>
+    </dgm:linClrLst>
+    <dgm:effectClrLst/>
+    <dgm:txLinClrLst/>
+    <dgm:txFillClrLst meth="repeat">
+      <a:schemeClr val="lt1"/>
+    </dgm:txFillClrLst>
+    <dgm:txEffectClrLst/>
+  </dgm:styleLbl>
+  <dgm:styleLbl name="bgImgPlace1">
+    <dgm:fillClrLst meth="repeat">
+      <a:schemeClr val="accent1">
+        <a:tint val="50000"/>
+      </a:schemeClr>
+    </dgm:fillClrLst>
+    <dgm:linClrLst meth="repeat">
+      <a:schemeClr val="lt1"/>
+    </dgm:linClrLst>
+    <dgm:effectClrLst/>
+    <dgm:txLinClrLst/>
+    <dgm:txFillClrLst meth="repeat">
+      <a:schemeClr val="lt1"/>
+    </dgm:txFillClrLst>
+    <dgm:txEffectClrLst/>
+  </dgm:styleLbl>
+  <dgm:styleLbl name="sibTrans2D1">
+    <dgm:fillClrLst meth="repeat">
+      <a:schemeClr val="accent1">
+        <a:tint val="60000"/>
+      </a:schemeClr>
+    </dgm:fillClrLst>
+    <dgm:linClrLst meth="repeat">
+      <a:schemeClr val="accent1">
+        <a:tint val="60000"/>
+      </a:schemeClr>
+    </dgm:linClrLst>
+    <dgm:effectClrLst/>
+    <dgm:txLinClrLst/>
+    <dgm:txFillClrLst/>
+    <dgm:txEffectClrLst/>
+  </dgm:styleLbl>
+  <dgm:styleLbl name="fgSibTrans2D1">
+    <dgm:fillClrLst meth="repeat">
+      <a:schemeClr val="accent1">
+        <a:tint val="60000"/>
+      </a:schemeClr>
+    </dgm:fillClrLst>
+    <dgm:linClrLst meth="repeat">
+      <a:schemeClr val="accent1">
+        <a:tint val="60000"/>
+      </a:schemeClr>
+    </dgm:linClrLst>
+    <dgm:effectClrLst/>
+    <dgm:txLinClrLst/>
+    <dgm:txFillClrLst/>
+    <dgm:txEffectClrLst/>
+  </dgm:styleLbl>
+  <dgm:styleLbl name="bgSibTrans2D1">
+    <dgm:fillClrLst meth="repeat">
+      <a:schemeClr val="accent1">
+        <a:tint val="60000"/>
+      </a:schemeClr>
+    </dgm:fillClrLst>
+    <dgm:linClrLst meth="repeat">
+      <a:schemeClr val="accent1">
+        <a:tint val="60000"/>
+      </a:schemeClr>
+    </dgm:linClrLst>
+    <dgm:effectClrLst/>
+    <dgm:txLinClrLst/>
+    <dgm:txFillClrLst/>
+    <dgm:txEffectClrLst/>
+  </dgm:styleLbl>
+  <dgm:styleLbl name="sibTrans1D1">
+    <dgm:fillClrLst meth="repeat">
+      <a:schemeClr val="accent1"/>
+    </dgm:fillClrLst>
+    <dgm:linClrLst meth="repeat">
+      <a:schemeClr val="accent1"/>
+    </dgm:linClrLst>
+    <dgm:effectClrLst/>
+    <dgm:txLinClrLst/>
+    <dgm:txFillClrLst meth="repeat">
+      <a:schemeClr val="tx1"/>
+    </dgm:txFillClrLst>
+    <dgm:txEffectClrLst/>
+  </dgm:styleLbl>
+  <dgm:styleLbl name="callout">
+    <dgm:fillClrLst meth="repeat">
+      <a:schemeClr val="accent1"/>
+    </dgm:fillClrLst>
+    <dgm:linClrLst meth="repeat">
+      <a:schemeClr val="accent1">
+        <a:tint val="50000"/>
+      </a:schemeClr>
+    </dgm:linClrLst>
+    <dgm:effectClrLst/>
+    <dgm:txLinClrLst/>
+    <dgm:txFillClrLst meth="repeat">
+      <a:schemeClr val="tx1"/>
+    </dgm:txFillClrLst>
+    <dgm:txEffectClrLst/>
+  </dgm:styleLbl>
+  <dgm:styleLbl name="asst0">
+    <dgm:fillClrLst meth="repeat">
+      <a:schemeClr val="accent1"/>
+    </dgm:fillClrLst>
+    <dgm:linClrLst meth="repeat">
+      <a:schemeClr val="lt1"/>
+    </dgm:linClrLst>
+    <dgm:effectClrLst/>
+    <dgm:txLinClrLst/>
+    <dgm:txFillClrLst/>
+    <dgm:txEffectClrLst/>
+  </dgm:styleLbl>
+  <dgm:styleLbl name="asst1">
+    <dgm:fillClrLst meth="repeat">
+      <a:schemeClr val="accent1"/>
+    </dgm:fillClrLst>
+    <dgm:linClrLst meth="repeat">
+      <a:schemeClr val="lt1"/>
+    </dgm:linClrLst>
+    <dgm:effectClrLst/>
+    <dgm:txLinClrLst/>
+    <dgm:txFillClrLst/>
+    <dgm:txEffectClrLst/>
+  </dgm:styleLbl>
+  <dgm:styleLbl name="asst2">
+    <dgm:fillClrLst meth="repeat">
+      <a:schemeClr val="accent1"/>
+    </dgm:fillClrLst>
+    <dgm:linClrLst meth="repeat">
+      <a:schemeClr val="lt1"/>
+    </dgm:linClrLst>
+    <dgm:effectClrLst/>
+    <dgm:txLinClrLst/>
+    <dgm:txFillClrLst/>
+    <dgm:txEffectClrLst/>
+  </dgm:styleLbl>
+  <dgm:styleLbl name="asst3">
+    <dgm:fillClrLst meth="repeat">
+      <a:schemeClr val="accent1"/>
+    </dgm:fillClrLst>
+    <dgm:linClrLst meth="repeat">
+      <a:schemeClr val="lt1"/>
+    </dgm:linClrLst>
+    <dgm:effectClrLst/>
+    <dgm:txLinClrLst/>
+    <dgm:txFillClrLst/>
+    <dgm:txEffectClrLst/>
+  </dgm:styleLbl>
+  <dgm:styleLbl name="asst4">
+    <dgm:fillClrLst meth="repeat">
+      <a:schemeClr val="accent1"/>
+    </dgm:fillClrLst>
+    <dgm:linClrLst meth="repeat">
+      <a:schemeClr val="lt1"/>
+    </dgm:linClrLst>
+    <dgm:effectClrLst/>
+    <dgm:txLinClrLst/>
+    <dgm:txFillClrLst/>
+    <dgm:txEffectClrLst/>
+  </dgm:styleLbl>
+  <dgm:styleLbl name="parChTrans2D1">
+    <dgm:fillClrLst meth="repeat">
+      <a:schemeClr val="accent1">
+        <a:tint val="60000"/>
+      </a:schemeClr>
+    </dgm:fillClrLst>
+    <dgm:linClrLst meth="repeat">
+      <a:schemeClr val="accent1">
+        <a:tint val="60000"/>
+      </a:schemeClr>
+    </dgm:linClrLst>
+    <dgm:effectClrLst/>
+    <dgm:txLinClrLst/>
+    <dgm:txFillClrLst meth="repeat">
+      <a:schemeClr val="lt1"/>
+    </dgm:txFillClrLst>
+    <dgm:txEffectClrLst/>
+  </dgm:styleLbl>
+  <dgm:styleLbl name="parChTrans2D2">
+    <dgm:fillClrLst meth="repeat">
+      <a:schemeClr val="accent1"/>
+    </dgm:fillClrLst>
+    <dgm:linClrLst meth="repeat">
+      <a:schemeClr val="accent1"/>
+    </dgm:linClrLst>
+    <dgm:effectClrLst/>
+    <dgm:txLinClrLst/>
+    <dgm:txFillClrLst meth="repeat">
+      <a:schemeClr val="lt1"/>
+    </dgm:txFillClrLst>
+    <dgm:txEffectClrLst/>
+  </dgm:styleLbl>
+  <dgm:styleLbl name="parChTrans2D3">
+    <dgm:fillClrLst meth="repeat">
+      <a:schemeClr val="accent1"/>
+    </dgm:fillClrLst>
+    <dgm:linClrLst meth="repeat">
+      <a:schemeClr val="accent1"/>
+    </dgm:linClrLst>
+    <dgm:effectClrLst/>
+    <dgm:txLinClrLst/>
+    <dgm:txFillClrLst meth="repeat">
+      <a:schemeClr val="lt1"/>
+    </dgm:txFillClrLst>
+    <dgm:txEffectClrLst/>
+  </dgm:styleLbl>
+  <dgm:styleLbl name="parChTrans2D4">
+    <dgm:fillClrLst meth="repeat">
+      <a:schemeClr val="accent1"/>
+    </dgm:fillClrLst>
+    <dgm:linClrLst meth="repeat">
+      <a:schemeClr val="accent1"/>
+    </dgm:linClrLst>
+    <dgm:effectClrLst/>
+    <dgm:txLinClrLst/>
+    <dgm:txFillClrLst meth="repeat">
+      <a:schemeClr val="lt1"/>
+    </dgm:txFillClrLst>
+    <dgm:txEffectClrLst/>
+  </dgm:styleLbl>
+  <dgm:styleLbl name="parChTrans1D1">
+    <dgm:fillClrLst meth="repeat">
+      <a:schemeClr val="accent1"/>
+    </dgm:fillClrLst>
+    <dgm:linClrLst meth="repeat">
+      <a:schemeClr val="accent1">
+        <a:shade val="60000"/>
+      </a:schemeClr>
+    </dgm:linClrLst>
+    <dgm:effectClrLst/>
+    <dgm:txLinClrLst/>
+    <dgm:txFillClrLst meth="repeat">
+      <a:schemeClr val="tx1"/>
+    </dgm:txFillClrLst>
+    <dgm:txEffectClrLst/>
+  </dgm:styleLbl>
+  <dgm:styleLbl name="parChTrans1D2">
+    <dgm:fillClrLst meth="repeat">
+      <a:schemeClr val="accent1"/>
+    </dgm:fillClrLst>
+    <dgm:linClrLst meth="repeat">
+      <a:schemeClr val="accent1">
+        <a:shade val="60000"/>
+      </a:schemeClr>
+    </dgm:linClrLst>
+    <dgm:effectClrLst/>
+    <dgm:txLinClrLst/>
+    <dgm:txFillClrLst meth="repeat">
+      <a:schemeClr val="tx1"/>
+    </dgm:txFillClrLst>
+    <dgm:txEffectClrLst/>
+  </dgm:styleLbl>
+  <dgm:styleLbl name="parChTrans1D3">
+    <dgm:fillClrLst meth="repeat">
+      <a:schemeClr val="accent1"/>
+    </dgm:fillClrLst>
+    <dgm:linClrLst meth="repeat">
+      <a:schemeClr val="accent1">
+        <a:shade val="80000"/>
+      </a:schemeClr>
+    </dgm:linClrLst>
+    <dgm:effectClrLst/>
+    <dgm:txLinClrLst/>
+    <dgm:txFillClrLst meth="repeat">
+      <a:schemeClr val="tx1"/>
+    </dgm:txFillClrLst>
+    <dgm:txEffectClrLst/>
+  </dgm:styleLbl>
+  <dgm:styleLbl name="parChTrans1D4">
+    <dgm:fillClrLst meth="repeat">
+      <a:schemeClr val="accent1"/>
+    </dgm:fillClrLst>
+    <dgm:linClrLst meth="repeat">
+      <a:schemeClr val="accent1">
+        <a:shade val="80000"/>
+      </a:schemeClr>
+    </dgm:linClrLst>
+    <dgm:effectClrLst/>
+    <dgm:txLinClrLst/>
+    <dgm:txFillClrLst meth="repeat">
+      <a:schemeClr val="tx1"/>
+    </dgm:txFillClrLst>
+    <dgm:txEffectClrLst/>
+  </dgm:styleLbl>
+  <dgm:styleLbl name="fgAcc1">
+    <dgm:fillClrLst meth="repeat">
+      <a:schemeClr val="lt1">
+        <a:alpha val="90000"/>
+      </a:schemeClr>
+    </dgm:fillClrLst>
+    <dgm:linClrLst meth="repeat">
+      <a:schemeClr val="accent1"/>
+    </dgm:linClrLst>
+    <dgm:effectClrLst/>
+    <dgm:txLinClrLst/>
+    <dgm:txFillClrLst meth="repeat">
+      <a:schemeClr val="dk1"/>
+    </dgm:txFillClrLst>
+    <dgm:txEffectClrLst/>
+  </dgm:styleLbl>
+  <dgm:styleLbl name="conFgAcc1">
+    <dgm:fillClrLst meth="repeat">
+      <a:schemeClr val="lt1">
+        <a:alpha val="90000"/>
+      </a:schemeClr>
+    </dgm:fillClrLst>
+    <dgm:linClrLst meth="repeat">
+      <a:schemeClr val="accent1"/>
+    </dgm:linClrLst>
+    <dgm:effectClrLst/>
+    <dgm:txLinClrLst/>
+    <dgm:txFillClrLst meth="repeat">
+      <a:schemeClr val="dk1"/>
+    </dgm:txFillClrLst>
+    <dgm:txEffectClrLst/>
+  </dgm:styleLbl>
+  <dgm:styleLbl name="alignAcc1">
+    <dgm:fillClrLst meth="repeat">
+      <a:schemeClr val="lt1">
+        <a:alpha val="90000"/>
+      </a:schemeClr>
+    </dgm:fillClrLst>
+    <dgm:linClrLst meth="repeat">
+      <a:schemeClr val="accent1"/>
+    </dgm:linClrLst>
+    <dgm:effectClrLst/>
+    <dgm:txLinClrLst/>
+    <dgm:txFillClrLst meth="repeat">
+      <a:schemeClr val="dk1"/>
+    </dgm:txFillClrLst>
+    <dgm:txEffectClrLst/>
+  </dgm:styleLbl>
+  <dgm:styleLbl name="trAlignAcc1">
+    <dgm:fillClrLst meth="repeat">
+      <a:schemeClr val="lt1">
+        <a:alpha val="40000"/>
+      </a:schemeClr>
+    </dgm:fillClrLst>
+    <dgm:linClrLst meth="repeat">
+      <a:schemeClr val="accent1"/>
+    </dgm:linClrLst>
+    <dgm:effectClrLst/>
+    <dgm:txLinClrLst/>
+    <dgm:txFillClrLst meth="repeat">
+      <a:schemeClr val="dk1"/>
+    </dgm:txFillClrLst>
+    <dgm:txEffectClrLst/>
+  </dgm:styleLbl>
+  <dgm:styleLbl name="bgAcc1">
+    <dgm:fillClrLst meth="repeat">
+      <a:schemeClr val="lt1">
+        <a:alpha val="90000"/>
+      </a:schemeClr>
+    </dgm:fillClrLst>
+    <dgm:linClrLst meth="repeat">
+      <a:schemeClr val="accent1"/>
+    </dgm:linClrLst>
+    <dgm:effectClrLst/>
+    <dgm:txLinClrLst/>
+    <dgm:txFillClrLst meth="repeat">
+      <a:schemeClr val="dk1"/>
+    </dgm:txFillClrLst>
+    <dgm:txEffectClrLst/>
+  </dgm:styleLbl>
+  <dgm:styleLbl name="solidFgAcc1">
+    <dgm:fillClrLst meth="repeat">
+      <a:schemeClr val="lt1"/>
+    </dgm:fillClrLst>
+    <dgm:linClrLst meth="repeat">
+      <a:schemeClr val="accent1"/>
+    </dgm:linClrLst>
+    <dgm:effectClrLst/>
+    <dgm:txLinClrLst/>
+    <dgm:txFillClrLst meth="repeat">
+      <a:schemeClr val="dk1"/>
+    </dgm:txFillClrLst>
+    <dgm:txEffectClrLst/>
+  </dgm:styleLbl>
+  <dgm:styleLbl name="solidAlignAcc1">
+    <dgm:fillClrLst meth="repeat">
+      <a:schemeClr val="lt1"/>
+    </dgm:fillClrLst>
+    <dgm:linClrLst meth="repeat">
+      <a:schemeClr val="accent1"/>
+    </dgm:linClrLst>
+    <dgm:effectClrLst/>
+    <dgm:txLinClrLst/>
+    <dgm:txFillClrLst meth="repeat">
+      <a:schemeClr val="dk1"/>
+    </dgm:txFillClrLst>
+    <dgm:txEffectClrLst/>
+  </dgm:styleLbl>
+  <dgm:styleLbl name="solidBgAcc1">
+    <dgm:fillClrLst meth="repeat">
+      <a:schemeClr val="lt1"/>
+    </dgm:fillClrLst>
+    <dgm:linClrLst meth="repeat">
+      <a:schemeClr val="accent1"/>
+    </dgm:linClrLst>
+    <dgm:effectClrLst/>
+    <dgm:txLinClrLst/>
+    <dgm:txFillClrLst meth="repeat">
+      <a:schemeClr val="dk1"/>
+    </dgm:txFillClrLst>
+    <dgm:txEffectClrLst/>
+  </dgm:styleLbl>
+  <dgm:styleLbl name="fgAccFollowNode1">
+    <dgm:fillClrLst meth="repeat">
+      <a:schemeClr val="accent1">
+        <a:alpha val="90000"/>
+        <a:tint val="40000"/>
+      </a:schemeClr>
+    </dgm:fillClrLst>
+    <dgm:linClrLst meth="repeat">
+      <a:schemeClr val="accent1">
+        <a:alpha val="90000"/>
+        <a:tint val="40000"/>
+      </a:schemeClr>
+    </dgm:linClrLst>
+    <dgm:effectClrLst/>
+    <dgm:txLinClrLst/>
+    <dgm:txFillClrLst meth="repeat">
+      <a:schemeClr val="dk1"/>
+    </dgm:txFillClrLst>
+    <dgm:txEffectClrLst/>
+  </dgm:styleLbl>
+  <dgm:styleLbl name="alignAccFollowNode1">
+    <dgm:fillClrLst meth="repeat">
+      <a:schemeClr val="accent1">
+        <a:alpha val="90000"/>
+        <a:tint val="40000"/>
+      </a:schemeClr>
+    </dgm:fillClrLst>
+    <dgm:linClrLst meth="repeat">
+      <a:schemeClr val="accent1">
+        <a:alpha val="90000"/>
+        <a:tint val="40000"/>
+      </a:schemeClr>
+    </dgm:linClrLst>
+    <dgm:effectClrLst/>
+    <dgm:txLinClrLst/>
+    <dgm:txFillClrLst meth="repeat">
+      <a:schemeClr val="dk1"/>
+    </dgm:txFillClrLst>
+    <dgm:txEffectClrLst/>
+  </dgm:styleLbl>
+  <dgm:styleLbl name="bgAccFollowNode1">
+    <dgm:fillClrLst meth="repeat">
+      <a:schemeClr val="accent1">
+        <a:alpha val="90000"/>
+        <a:tint val="40000"/>
+      </a:schemeClr>
+    </dgm:fillClrLst>
+    <dgm:linClrLst meth="repeat">
+      <a:schemeClr val="accent1">
+        <a:alpha val="90000"/>
+        <a:tint val="40000"/>
+      </a:schemeClr>
+    </dgm:linClrLst>
+    <dgm:effectClrLst/>
+    <dgm:txLinClrLst/>
+    <dgm:txFillClrLst meth="repeat">
+      <a:schemeClr val="dk1"/>
+    </dgm:txFillClrLst>
+    <dgm:txEffectClrLst/>
+  </dgm:styleLbl>
+  <dgm:styleLbl name="fgAcc0">
+    <dgm:fillClrLst meth="repeat">
+      <a:schemeClr val="lt1">
+        <a:alpha val="90000"/>
+      </a:schemeClr>
+    </dgm:fillClrLst>
+    <dgm:linClrLst meth="repeat">
+      <a:schemeClr val="accent1"/>
+    </dgm:linClrLst>
+    <dgm:effectClrLst/>
+    <dgm:txLinClrLst/>
+    <dgm:txFillClrLst meth="repeat">
+      <a:schemeClr val="dk1"/>
+    </dgm:txFillClrLst>
+    <dgm:txEffectClrLst/>
+  </dgm:styleLbl>
+  <dgm:styleLbl name="fgAcc2">
+    <dgm:fillClrLst meth="repeat">
+      <a:schemeClr val="lt1">
+        <a:alpha val="90000"/>
+      </a:schemeClr>
+    </dgm:fillClrLst>
+    <dgm:linClrLst meth="repeat">
+      <a:schemeClr val="accent1"/>
+    </dgm:linClrLst>
+    <dgm:effectClrLst/>
+    <dgm:txLinClrLst/>
+    <dgm:txFillClrLst meth="repeat">
+      <a:schemeClr val="dk1"/>
+    </dgm:txFillClrLst>
+    <dgm:txEffectClrLst/>
+  </dgm:styleLbl>
+  <dgm:styleLbl name="fgAcc3">
+    <dgm:fillClrLst meth="repeat">
+      <a:schemeClr val="lt1">
+        <a:alpha val="90000"/>
+      </a:schemeClr>
+    </dgm:fillClrLst>
+    <dgm:linClrLst meth="repeat">
+      <a:schemeClr val="accent1"/>
+    </dgm:linClrLst>
+    <dgm:effectClrLst/>
+    <dgm:txLinClrLst/>
+    <dgm:txFillClrLst meth="repeat">
+      <a:schemeClr val="dk1"/>
+    </dgm:txFillClrLst>
+    <dgm:txEffectClrLst/>
+  </dgm:styleLbl>
+  <dgm:styleLbl name="fgAcc4">
+    <dgm:fillClrLst meth="repeat">
+      <a:schemeClr val="lt1">
+        <a:alpha val="90000"/>
+      </a:schemeClr>
+    </dgm:fillClrLst>
+    <dgm:linClrLst meth="repeat">
+      <a:schemeClr val="accent1"/>
+    </dgm:linClrLst>
+    <dgm:effectClrLst/>
+    <dgm:txLinClrLst/>
+    <dgm:txFillClrLst meth="repeat">
+      <a:schemeClr val="dk1"/>
+    </dgm:txFillClrLst>
+    <dgm:txEffectClrLst/>
+  </dgm:styleLbl>
+  <dgm:styleLbl name="bgShp">
+    <dgm:fillClrLst meth="repeat">
+      <a:schemeClr val="accent1">
+        <a:tint val="40000"/>
+      </a:schemeClr>
+    </dgm:fillClrLst>
+    <dgm:linClrLst meth="repeat">
+      <a:schemeClr val="accent1"/>
+    </dgm:linClrLst>
+    <dgm:effectClrLst/>
+    <dgm:txLinClrLst/>
+    <dgm:txFillClrLst meth="repeat">
+      <a:schemeClr val="dk1"/>
+    </dgm:txFillClrLst>
+    <dgm:txEffectClrLst/>
+  </dgm:styleLbl>
+  <dgm:styleLbl name="dkBgShp">
+    <dgm:fillClrLst meth="repeat">
+      <a:schemeClr val="accent1">
+        <a:shade val="80000"/>
+      </a:schemeClr>
+    </dgm:fillClrLst>
+    <dgm:linClrLst meth="repeat">
+      <a:schemeClr val="accent1"/>
+    </dgm:linClrLst>
+    <dgm:effectClrLst/>
+    <dgm:txLinClrLst/>
+    <dgm:txFillClrLst meth="repeat">
+      <a:schemeClr val="lt1"/>
+    </dgm:txFillClrLst>
+    <dgm:txEffectClrLst/>
+  </dgm:styleLbl>
+  <dgm:styleLbl name="trBgShp">
+    <dgm:fillClrLst meth="repeat">
+      <a:schemeClr val="accent1">
+        <a:tint val="50000"/>
+        <a:alpha val="40000"/>
+      </a:schemeClr>
+    </dgm:fillClrLst>
+    <dgm:linClrLst meth="repeat">
+      <a:schemeClr val="accent1"/>
+    </dgm:linClrLst>
+    <dgm:effectClrLst/>
+    <dgm:txLinClrLst/>
+    <dgm:txFillClrLst meth="repeat">
+      <a:schemeClr val="lt1"/>
+    </dgm:txFillClrLst>
+    <dgm:txEffectClrLst/>
+  </dgm:styleLbl>
+  <dgm:styleLbl name="fgShp">
+    <dgm:fillClrLst meth="repeat">
+      <a:schemeClr val="accent1">
+        <a:tint val="60000"/>
+      </a:schemeClr>
+    </dgm:fillClrLst>
+    <dgm:linClrLst meth="repeat">
+      <a:schemeClr val="lt1"/>
+    </dgm:linClrLst>
+    <dgm:effectClrLst/>
+    <dgm:txLinClrLst/>
+    <dgm:txFillClrLst meth="repeat">
+      <a:schemeClr val="dk1"/>
+    </dgm:txFillClrLst>
+    <dgm:txEffectClrLst/>
+  </dgm:styleLbl>
+  <dgm:styleLbl name="revTx">
+    <dgm:fillClrLst meth="repeat">
+      <a:schemeClr val="lt1">
+        <a:alpha val="0"/>
+      </a:schemeClr>
+    </dgm:fillClrLst>
+    <dgm:linClrLst meth="repeat">
+      <a:schemeClr val="dk1">
+        <a:alpha val="0"/>
+      </a:schemeClr>
+    </dgm:linClrLst>
+    <dgm:effectClrLst/>
+    <dgm:txLinClrLst/>
+    <dgm:txFillClrLst meth="repeat">
+      <a:schemeClr val="tx1"/>
+    </dgm:txFillClrLst>
+    <dgm:txEffectClrLst/>
+  </dgm:styleLbl>
+</dgm:colorsDef>
+</file>
+
+<file path=ppt/diagrams/colors8.xml><?xml version="1.0" encoding="utf-8"?>
 <dgm:colorsDef xmlns:dgm="http://schemas.openxmlformats.org/drawingml/2006/diagram" xmlns:a="http://schemas.openxmlformats.org/drawingml/2006/main" uniqueId="urn:microsoft.com/office/officeart/2005/8/colors/accent1_2">
   <dgm:title val=""/>
   <dgm:desc val=""/>
@@ -8145,6 +8894,485 @@
     <dgm:cxn modelId="{1C81B5B4-EF74-4EE6-B68E-32D9E7CDEF93}" type="presParOf" srcId="{2BDFC1B1-AA42-4E54-A320-42CEF235D817}" destId="{99CD628B-7BB3-4FAB-BA15-331F13D2920D}" srcOrd="8" destOrd="0" presId="urn:microsoft.com/office/officeart/2005/8/layout/default"/>
     <dgm:cxn modelId="{33539AB0-7324-421E-986B-8CA2E6D6625D}" type="presParOf" srcId="{2BDFC1B1-AA42-4E54-A320-42CEF235D817}" destId="{EFFB95F3-49C0-427C-91B6-B73DA6FB4983}" srcOrd="9" destOrd="0" presId="urn:microsoft.com/office/officeart/2005/8/layout/default"/>
     <dgm:cxn modelId="{9AE158D5-CD5A-40EB-BAEB-AA6BAC0BE573}" type="presParOf" srcId="{2BDFC1B1-AA42-4E54-A320-42CEF235D817}" destId="{72515A94-7344-4F0B-82E6-E2E9E475EF8D}" srcOrd="10" destOrd="0" presId="urn:microsoft.com/office/officeart/2005/8/layout/default"/>
+  </dgm:cxnLst>
+  <dgm:bg/>
+  <dgm:whole/>
+  <dgm:extLst>
+    <a:ext uri="http://schemas.microsoft.com/office/drawing/2008/diagram">
+      <dsp:dataModelExt xmlns:dsp="http://schemas.microsoft.com/office/drawing/2008/diagram" relId="rId7" minVer="http://schemas.openxmlformats.org/drawingml/2006/diagram"/>
+    </a:ext>
+  </dgm:extLst>
+</dgm:dataModel>
+</file>
+
+<file path=ppt/diagrams/data8.xml><?xml version="1.0" encoding="utf-8"?>
+<dgm:dataModel xmlns:dgm="http://schemas.openxmlformats.org/drawingml/2006/diagram" xmlns:a="http://schemas.openxmlformats.org/drawingml/2006/main">
+  <dgm:ptLst>
+    <dgm:pt modelId="{7C0767F4-49A8-4C1D-9FAC-3BC49D08218E}" type="doc">
+      <dgm:prSet loTypeId="urn:microsoft.com/office/officeart/2005/8/layout/default" loCatId="list" qsTypeId="urn:microsoft.com/office/officeart/2005/8/quickstyle/simple1" qsCatId="simple" csTypeId="urn:microsoft.com/office/officeart/2005/8/colors/accent1_2" csCatId="accent1" phldr="1"/>
+      <dgm:spPr/>
+      <dgm:t>
+        <a:bodyPr/>
+        <a:lstStyle/>
+        <a:p>
+          <a:endParaRPr lang="en-US"/>
+        </a:p>
+      </dgm:t>
+    </dgm:pt>
+    <dgm:pt modelId="{545BC824-6181-4CA1-82E5-53DD81752149}">
+      <dgm:prSet phldrT="[Text]"/>
+      <dgm:spPr/>
+      <dgm:t>
+        <a:bodyPr/>
+        <a:lstStyle/>
+        <a:p>
+          <a:r>
+            <a:rPr lang="de-DE" dirty="0"/>
+            <a:t>8.1: Als Kunde möchte ich an meiner Zahlungsanweisung einen Zweck eingeben können, um einen besseren Überblick über meine Geldströme zu erhalten.</a:t>
+          </a:r>
+          <a:endParaRPr lang="en-US" dirty="0"/>
+        </a:p>
+      </dgm:t>
+    </dgm:pt>
+    <dgm:pt modelId="{ACF386FC-FFFA-4BC7-84C7-E5875848454F}" type="parTrans" cxnId="{4FF7C5E9-9DC3-4EA5-8FAE-8B6995018ACE}">
+      <dgm:prSet/>
+      <dgm:spPr/>
+      <dgm:t>
+        <a:bodyPr/>
+        <a:lstStyle/>
+        <a:p>
+          <a:endParaRPr lang="en-US"/>
+        </a:p>
+      </dgm:t>
+    </dgm:pt>
+    <dgm:pt modelId="{DEB0E6D2-D714-4D02-A926-5D0BEB0E678A}" type="sibTrans" cxnId="{4FF7C5E9-9DC3-4EA5-8FAE-8B6995018ACE}">
+      <dgm:prSet/>
+      <dgm:spPr/>
+      <dgm:t>
+        <a:bodyPr/>
+        <a:lstStyle/>
+        <a:p>
+          <a:endParaRPr lang="en-US"/>
+        </a:p>
+      </dgm:t>
+    </dgm:pt>
+    <dgm:pt modelId="{B2FF2244-25BF-4822-86C9-58B73A90BF97}">
+      <dgm:prSet phldrT="[Text]"/>
+      <dgm:spPr/>
+      <dgm:t>
+        <a:bodyPr/>
+        <a:lstStyle/>
+        <a:p>
+          <a:r>
+            <a:rPr lang="de-DE" dirty="0"/>
+            <a:t>8.2: Als Kunde möchte ich über die Weboberfläche einen Nutzeraccount anlegen, um auf die Dienste der </a:t>
+          </a:r>
+          <a:r>
+            <a:rPr lang="de-DE" dirty="0" err="1"/>
+            <a:t>BuggyBank</a:t>
+          </a:r>
+          <a:r>
+            <a:rPr lang="de-DE" dirty="0"/>
+            <a:t> zugreifen zu können.</a:t>
+          </a:r>
+          <a:endParaRPr lang="en-US" dirty="0"/>
+        </a:p>
+      </dgm:t>
+    </dgm:pt>
+    <dgm:pt modelId="{7D8CF92F-726F-49BD-948B-6C3D832D8D98}" type="parTrans" cxnId="{B096A43F-BC63-4F7F-9C05-714437F3ACE0}">
+      <dgm:prSet/>
+      <dgm:spPr/>
+      <dgm:t>
+        <a:bodyPr/>
+        <a:lstStyle/>
+        <a:p>
+          <a:endParaRPr lang="en-US"/>
+        </a:p>
+      </dgm:t>
+    </dgm:pt>
+    <dgm:pt modelId="{C1DF4F7E-43A2-4BC6-8110-078643A8D34C}" type="sibTrans" cxnId="{B096A43F-BC63-4F7F-9C05-714437F3ACE0}">
+      <dgm:prSet/>
+      <dgm:spPr/>
+      <dgm:t>
+        <a:bodyPr/>
+        <a:lstStyle/>
+        <a:p>
+          <a:endParaRPr lang="en-US"/>
+        </a:p>
+      </dgm:t>
+    </dgm:pt>
+    <dgm:pt modelId="{604A8E2C-557E-4D05-8E20-D365DEBA631A}">
+      <dgm:prSet phldrT="[Text]"/>
+      <dgm:spPr/>
+      <dgm:t>
+        <a:bodyPr/>
+        <a:lstStyle/>
+        <a:p>
+          <a:r>
+            <a:rPr lang="de-DE" dirty="0"/>
+            <a:t>8.3: Als Kunde möchte ich über die Weboberfläche Konten anlegen, um dafür nicht zur Filiale laufen zu müssen.</a:t>
+          </a:r>
+          <a:endParaRPr lang="en-US" dirty="0"/>
+        </a:p>
+      </dgm:t>
+    </dgm:pt>
+    <dgm:pt modelId="{5647B031-1983-44BD-960E-452E61D30734}" type="parTrans" cxnId="{DD581AC7-0C64-4BB4-8200-0E5E7E6F3CE9}">
+      <dgm:prSet/>
+      <dgm:spPr/>
+      <dgm:t>
+        <a:bodyPr/>
+        <a:lstStyle/>
+        <a:p>
+          <a:endParaRPr lang="en-US"/>
+        </a:p>
+      </dgm:t>
+    </dgm:pt>
+    <dgm:pt modelId="{4019C53A-F400-457E-83E5-901B509A72F0}" type="sibTrans" cxnId="{DD581AC7-0C64-4BB4-8200-0E5E7E6F3CE9}">
+      <dgm:prSet/>
+      <dgm:spPr/>
+      <dgm:t>
+        <a:bodyPr/>
+        <a:lstStyle/>
+        <a:p>
+          <a:endParaRPr lang="en-US"/>
+        </a:p>
+      </dgm:t>
+    </dgm:pt>
+    <dgm:pt modelId="{9D494315-3D3B-4018-B189-6DCB18156986}">
+      <dgm:prSet phldrT="[Text]"/>
+      <dgm:spPr/>
+      <dgm:t>
+        <a:bodyPr/>
+        <a:lstStyle/>
+        <a:p>
+          <a:r>
+            <a:rPr lang="de-DE" dirty="0"/>
+            <a:t>8.4: Als Kunde möchte ich meinen Konten einen Namen geben können, um z.B. mein Sparkonto von meinem Girokonto zu unterscheiden.</a:t>
+          </a:r>
+          <a:endParaRPr lang="en-US" dirty="0"/>
+        </a:p>
+      </dgm:t>
+    </dgm:pt>
+    <dgm:pt modelId="{C4E92B66-4362-4C26-A4DF-FF74C8DEEB20}" type="parTrans" cxnId="{9381D498-56EB-42B8-9D72-F4301A0B892D}">
+      <dgm:prSet/>
+      <dgm:spPr/>
+      <dgm:t>
+        <a:bodyPr/>
+        <a:lstStyle/>
+        <a:p>
+          <a:endParaRPr lang="en-US"/>
+        </a:p>
+      </dgm:t>
+    </dgm:pt>
+    <dgm:pt modelId="{221D5FC9-41AE-4FAB-AF2F-4A186072081A}" type="sibTrans" cxnId="{9381D498-56EB-42B8-9D72-F4301A0B892D}">
+      <dgm:prSet/>
+      <dgm:spPr/>
+      <dgm:t>
+        <a:bodyPr/>
+        <a:lstStyle/>
+        <a:p>
+          <a:endParaRPr lang="en-US"/>
+        </a:p>
+      </dgm:t>
+    </dgm:pt>
+    <dgm:pt modelId="{8C292CDF-2DE1-4236-B899-38BF4672A29D}">
+      <dgm:prSet phldrT="[Text]"/>
+      <dgm:spPr/>
+      <dgm:t>
+        <a:bodyPr/>
+        <a:lstStyle/>
+        <a:p>
+          <a:r>
+            <a:rPr lang="de-DE" dirty="0"/>
+            <a:t>8.5: Als Geschäftsführer möchte ich den Kunden Überweisungen an andere Banken ermöglichen, um ihnen die Zahlungsvorgänge zu erleichtern. Die ersten vier Stellen einer Kontonummer sind die Bankleitzahl (bei uns 1234).</a:t>
+          </a:r>
+          <a:br>
+            <a:rPr lang="de-DE" dirty="0"/>
+          </a:br>
+          <a:r>
+            <a:rPr lang="de-DE" dirty="0"/>
+            <a:t>Wird eine Überweisung an eine andere Bank angewiesen, buchen wir intern auf das Konto 000.</a:t>
+          </a:r>
+          <a:endParaRPr lang="en-US" dirty="0"/>
+        </a:p>
+      </dgm:t>
+    </dgm:pt>
+    <dgm:pt modelId="{2C16F9AA-1B1D-42E0-A6B3-32D6A0154F7E}" type="parTrans" cxnId="{9A18A694-FA3C-4A6A-966D-483B3053A588}">
+      <dgm:prSet/>
+      <dgm:spPr/>
+      <dgm:t>
+        <a:bodyPr/>
+        <a:lstStyle/>
+        <a:p>
+          <a:endParaRPr lang="en-US"/>
+        </a:p>
+      </dgm:t>
+    </dgm:pt>
+    <dgm:pt modelId="{C0E3F6E3-B24A-4E3E-BAB7-E3BF6F1C5F3A}" type="sibTrans" cxnId="{9A18A694-FA3C-4A6A-966D-483B3053A588}">
+      <dgm:prSet/>
+      <dgm:spPr/>
+      <dgm:t>
+        <a:bodyPr/>
+        <a:lstStyle/>
+        <a:p>
+          <a:endParaRPr lang="en-US"/>
+        </a:p>
+      </dgm:t>
+    </dgm:pt>
+    <dgm:pt modelId="{A852D13A-7023-4AD1-AA89-1D32F7B0FC6C}">
+      <dgm:prSet phldrT="[Text]"/>
+      <dgm:spPr/>
+      <dgm:t>
+        <a:bodyPr/>
+        <a:lstStyle/>
+        <a:p>
+          <a:r>
+            <a:rPr lang="de-DE" dirty="0"/>
+            <a:t>8.6: Als Bürosachbearbeiter möchte ich das Sonderkonto 000 nicht mit in der Kontoübersicht anzeigen. Stattdessen soll es auf der Kontoübersicht separat angezeigt werden, um die Geldbestände der Kunden und der Bank getrennt sehen zu können.</a:t>
+          </a:r>
+          <a:endParaRPr lang="en-US" dirty="0"/>
+        </a:p>
+      </dgm:t>
+    </dgm:pt>
+    <dgm:pt modelId="{05802833-ABE9-47E0-9198-AB80D5D49278}" type="parTrans" cxnId="{7EFB1CF2-CF1E-4711-9F72-FA15E90827B0}">
+      <dgm:prSet/>
+      <dgm:spPr/>
+      <dgm:t>
+        <a:bodyPr/>
+        <a:lstStyle/>
+        <a:p>
+          <a:endParaRPr lang="en-US"/>
+        </a:p>
+      </dgm:t>
+    </dgm:pt>
+    <dgm:pt modelId="{E495C62C-306B-4582-A9A3-03418EDE54BC}" type="sibTrans" cxnId="{7EFB1CF2-CF1E-4711-9F72-FA15E90827B0}">
+      <dgm:prSet/>
+      <dgm:spPr/>
+      <dgm:t>
+        <a:bodyPr/>
+        <a:lstStyle/>
+        <a:p>
+          <a:endParaRPr lang="en-US"/>
+        </a:p>
+      </dgm:t>
+    </dgm:pt>
+    <dgm:pt modelId="{C807BCD1-4BB0-49F9-B14B-EC16E66331D6}">
+      <dgm:prSet phldrT="[Text]"/>
+      <dgm:spPr/>
+      <dgm:t>
+        <a:bodyPr/>
+        <a:lstStyle/>
+        <a:p>
+          <a:r>
+            <a:rPr lang="de-DE" dirty="0"/>
+            <a:t>8.7: Als Kunde möchte ich die Anwendung in einer modernen, zeitgemäßen Aufmachung erleben, damit der Umgang mit der </a:t>
+          </a:r>
+          <a:r>
+            <a:rPr lang="de-DE" dirty="0" err="1"/>
+            <a:t>BuggyBank</a:t>
+          </a:r>
+          <a:r>
+            <a:rPr lang="de-DE" dirty="0"/>
+            <a:t> Spaß macht. Überraschen Sie mich!</a:t>
+          </a:r>
+          <a:endParaRPr lang="en-US" dirty="0"/>
+        </a:p>
+      </dgm:t>
+    </dgm:pt>
+    <dgm:pt modelId="{680740F7-6C20-4CFC-AD21-CF27CDD29FBA}" type="parTrans" cxnId="{4BCB0846-6FBD-4F0D-BCBB-86D314814D75}">
+      <dgm:prSet/>
+      <dgm:spPr/>
+      <dgm:t>
+        <a:bodyPr/>
+        <a:lstStyle/>
+        <a:p>
+          <a:endParaRPr lang="en-US"/>
+        </a:p>
+      </dgm:t>
+    </dgm:pt>
+    <dgm:pt modelId="{9817186A-D896-4C09-913E-56E92F6DAA8F}" type="sibTrans" cxnId="{4BCB0846-6FBD-4F0D-BCBB-86D314814D75}">
+      <dgm:prSet/>
+      <dgm:spPr/>
+      <dgm:t>
+        <a:bodyPr/>
+        <a:lstStyle/>
+        <a:p>
+          <a:endParaRPr lang="en-US"/>
+        </a:p>
+      </dgm:t>
+    </dgm:pt>
+    <dgm:pt modelId="{1105ADA4-8770-4C84-9C71-DCE71A12CDD4}">
+      <dgm:prSet phldrT="[Text]"/>
+      <dgm:spPr/>
+      <dgm:t>
+        <a:bodyPr/>
+        <a:lstStyle/>
+        <a:p>
+          <a:r>
+            <a:rPr lang="de-DE" dirty="0"/>
+            <a:t>8.6: Als Kunde möchte ich eine Bestätigung auf dem Bildschirm erhalten, wenn ich eine Zahlung anweise, um sicher zu sein, dass die Zahlung auch durchgeführt wurde.</a:t>
+          </a:r>
+          <a:endParaRPr lang="en-US" dirty="0"/>
+        </a:p>
+      </dgm:t>
+    </dgm:pt>
+    <dgm:pt modelId="{E649584D-7137-4DBA-AA93-8E4F7F71F64A}" type="parTrans" cxnId="{0425F82E-7DAC-4A61-9FD0-049694EB695F}">
+      <dgm:prSet/>
+      <dgm:spPr/>
+      <dgm:t>
+        <a:bodyPr/>
+        <a:lstStyle/>
+        <a:p>
+          <a:endParaRPr lang="en-US"/>
+        </a:p>
+      </dgm:t>
+    </dgm:pt>
+    <dgm:pt modelId="{F5DFB202-4D70-4957-90A1-EEAE1F2FC58D}" type="sibTrans" cxnId="{0425F82E-7DAC-4A61-9FD0-049694EB695F}">
+      <dgm:prSet/>
+      <dgm:spPr/>
+      <dgm:t>
+        <a:bodyPr/>
+        <a:lstStyle/>
+        <a:p>
+          <a:endParaRPr lang="en-US"/>
+        </a:p>
+      </dgm:t>
+    </dgm:pt>
+    <dgm:pt modelId="{2BDFC1B1-AA42-4E54-A320-42CEF235D817}" type="pres">
+      <dgm:prSet presAssocID="{7C0767F4-49A8-4C1D-9FAC-3BC49D08218E}" presName="diagram" presStyleCnt="0">
+        <dgm:presLayoutVars>
+          <dgm:dir/>
+          <dgm:resizeHandles val="exact"/>
+        </dgm:presLayoutVars>
+      </dgm:prSet>
+      <dgm:spPr/>
+    </dgm:pt>
+    <dgm:pt modelId="{D2D37EEF-8767-427D-BF99-23DC946B5378}" type="pres">
+      <dgm:prSet presAssocID="{545BC824-6181-4CA1-82E5-53DD81752149}" presName="node" presStyleLbl="node1" presStyleIdx="0" presStyleCnt="8">
+        <dgm:presLayoutVars>
+          <dgm:bulletEnabled val="1"/>
+        </dgm:presLayoutVars>
+      </dgm:prSet>
+      <dgm:spPr/>
+    </dgm:pt>
+    <dgm:pt modelId="{E871252D-F1FD-491C-9729-C0B2091AAA7A}" type="pres">
+      <dgm:prSet presAssocID="{DEB0E6D2-D714-4D02-A926-5D0BEB0E678A}" presName="sibTrans" presStyleCnt="0"/>
+      <dgm:spPr/>
+    </dgm:pt>
+    <dgm:pt modelId="{CE139165-265D-4BB4-9ADB-327EEFC6E7F5}" type="pres">
+      <dgm:prSet presAssocID="{B2FF2244-25BF-4822-86C9-58B73A90BF97}" presName="node" presStyleLbl="node1" presStyleIdx="1" presStyleCnt="8">
+        <dgm:presLayoutVars>
+          <dgm:bulletEnabled val="1"/>
+        </dgm:presLayoutVars>
+      </dgm:prSet>
+      <dgm:spPr/>
+    </dgm:pt>
+    <dgm:pt modelId="{80F173D3-183E-4E14-9F46-C0AF583102BA}" type="pres">
+      <dgm:prSet presAssocID="{C1DF4F7E-43A2-4BC6-8110-078643A8D34C}" presName="sibTrans" presStyleCnt="0"/>
+      <dgm:spPr/>
+    </dgm:pt>
+    <dgm:pt modelId="{F13CCEE5-2092-48AA-836F-8C5B6A83EFEF}" type="pres">
+      <dgm:prSet presAssocID="{604A8E2C-557E-4D05-8E20-D365DEBA631A}" presName="node" presStyleLbl="node1" presStyleIdx="2" presStyleCnt="8">
+        <dgm:presLayoutVars>
+          <dgm:bulletEnabled val="1"/>
+        </dgm:presLayoutVars>
+      </dgm:prSet>
+      <dgm:spPr/>
+    </dgm:pt>
+    <dgm:pt modelId="{639CD596-1132-4F67-8B20-14662FFE1B0D}" type="pres">
+      <dgm:prSet presAssocID="{4019C53A-F400-457E-83E5-901B509A72F0}" presName="sibTrans" presStyleCnt="0"/>
+      <dgm:spPr/>
+    </dgm:pt>
+    <dgm:pt modelId="{FC7D108C-9EAC-498F-93A8-382E3C259395}" type="pres">
+      <dgm:prSet presAssocID="{9D494315-3D3B-4018-B189-6DCB18156986}" presName="node" presStyleLbl="node1" presStyleIdx="3" presStyleCnt="8">
+        <dgm:presLayoutVars>
+          <dgm:bulletEnabled val="1"/>
+        </dgm:presLayoutVars>
+      </dgm:prSet>
+      <dgm:spPr/>
+    </dgm:pt>
+    <dgm:pt modelId="{026FC7D9-52D9-468A-A2CB-6ED3B992653D}" type="pres">
+      <dgm:prSet presAssocID="{221D5FC9-41AE-4FAB-AF2F-4A186072081A}" presName="sibTrans" presStyleCnt="0"/>
+      <dgm:spPr/>
+    </dgm:pt>
+    <dgm:pt modelId="{7909ABF9-0D9E-4E6B-B3E1-21B230154AFD}" type="pres">
+      <dgm:prSet presAssocID="{8C292CDF-2DE1-4236-B899-38BF4672A29D}" presName="node" presStyleLbl="node1" presStyleIdx="4" presStyleCnt="8">
+        <dgm:presLayoutVars>
+          <dgm:bulletEnabled val="1"/>
+        </dgm:presLayoutVars>
+      </dgm:prSet>
+      <dgm:spPr/>
+    </dgm:pt>
+    <dgm:pt modelId="{255E9E52-5D5A-4D17-9F04-6E27C3C7B35F}" type="pres">
+      <dgm:prSet presAssocID="{C0E3F6E3-B24A-4E3E-BAB7-E3BF6F1C5F3A}" presName="sibTrans" presStyleCnt="0"/>
+      <dgm:spPr/>
+    </dgm:pt>
+    <dgm:pt modelId="{37A2C711-6FE3-48F1-9D79-308AD2E326E5}" type="pres">
+      <dgm:prSet presAssocID="{A852D13A-7023-4AD1-AA89-1D32F7B0FC6C}" presName="node" presStyleLbl="node1" presStyleIdx="5" presStyleCnt="8">
+        <dgm:presLayoutVars>
+          <dgm:bulletEnabled val="1"/>
+        </dgm:presLayoutVars>
+      </dgm:prSet>
+      <dgm:spPr/>
+    </dgm:pt>
+    <dgm:pt modelId="{EAE82ABC-A82C-45F4-8D41-C7CEF12F8927}" type="pres">
+      <dgm:prSet presAssocID="{E495C62C-306B-4582-A9A3-03418EDE54BC}" presName="sibTrans" presStyleCnt="0"/>
+      <dgm:spPr/>
+    </dgm:pt>
+    <dgm:pt modelId="{FA2DDB49-5997-4894-B0F0-224F3A5D3841}" type="pres">
+      <dgm:prSet presAssocID="{C807BCD1-4BB0-49F9-B14B-EC16E66331D6}" presName="node" presStyleLbl="node1" presStyleIdx="6" presStyleCnt="8">
+        <dgm:presLayoutVars>
+          <dgm:bulletEnabled val="1"/>
+        </dgm:presLayoutVars>
+      </dgm:prSet>
+      <dgm:spPr/>
+    </dgm:pt>
+    <dgm:pt modelId="{70D323CB-5572-4135-A977-E219707E667D}" type="pres">
+      <dgm:prSet presAssocID="{9817186A-D896-4C09-913E-56E92F6DAA8F}" presName="sibTrans" presStyleCnt="0"/>
+      <dgm:spPr/>
+    </dgm:pt>
+    <dgm:pt modelId="{A477DE5B-A060-41E7-9103-8E59E56504C9}" type="pres">
+      <dgm:prSet presAssocID="{1105ADA4-8770-4C84-9C71-DCE71A12CDD4}" presName="node" presStyleLbl="node1" presStyleIdx="7" presStyleCnt="8">
+        <dgm:presLayoutVars>
+          <dgm:bulletEnabled val="1"/>
+        </dgm:presLayoutVars>
+      </dgm:prSet>
+      <dgm:spPr/>
+    </dgm:pt>
+  </dgm:ptLst>
+  <dgm:cxnLst>
+    <dgm:cxn modelId="{0425F82E-7DAC-4A61-9FD0-049694EB695F}" srcId="{7C0767F4-49A8-4C1D-9FAC-3BC49D08218E}" destId="{1105ADA4-8770-4C84-9C71-DCE71A12CDD4}" srcOrd="7" destOrd="0" parTransId="{E649584D-7137-4DBA-AA93-8E4F7F71F64A}" sibTransId="{F5DFB202-4D70-4957-90A1-EEAE1F2FC58D}"/>
+    <dgm:cxn modelId="{62F74D37-B645-4DBE-B362-11A5943935B0}" type="presOf" srcId="{8C292CDF-2DE1-4236-B899-38BF4672A29D}" destId="{7909ABF9-0D9E-4E6B-B3E1-21B230154AFD}" srcOrd="0" destOrd="0" presId="urn:microsoft.com/office/officeart/2005/8/layout/default"/>
+    <dgm:cxn modelId="{B096A43F-BC63-4F7F-9C05-714437F3ACE0}" srcId="{7C0767F4-49A8-4C1D-9FAC-3BC49D08218E}" destId="{B2FF2244-25BF-4822-86C9-58B73A90BF97}" srcOrd="1" destOrd="0" parTransId="{7D8CF92F-726F-49BD-948B-6C3D832D8D98}" sibTransId="{C1DF4F7E-43A2-4BC6-8110-078643A8D34C}"/>
+    <dgm:cxn modelId="{03A60A44-2033-4F36-B497-05B3A6D4BB4E}" type="presOf" srcId="{7C0767F4-49A8-4C1D-9FAC-3BC49D08218E}" destId="{2BDFC1B1-AA42-4E54-A320-42CEF235D817}" srcOrd="0" destOrd="0" presId="urn:microsoft.com/office/officeart/2005/8/layout/default"/>
+    <dgm:cxn modelId="{4BCB0846-6FBD-4F0D-BCBB-86D314814D75}" srcId="{7C0767F4-49A8-4C1D-9FAC-3BC49D08218E}" destId="{C807BCD1-4BB0-49F9-B14B-EC16E66331D6}" srcOrd="6" destOrd="0" parTransId="{680740F7-6C20-4CFC-AD21-CF27CDD29FBA}" sibTransId="{9817186A-D896-4C09-913E-56E92F6DAA8F}"/>
+    <dgm:cxn modelId="{1ACFDD4E-3DB0-4686-9D57-EAF335C2710F}" type="presOf" srcId="{9D494315-3D3B-4018-B189-6DCB18156986}" destId="{FC7D108C-9EAC-498F-93A8-382E3C259395}" srcOrd="0" destOrd="0" presId="urn:microsoft.com/office/officeart/2005/8/layout/default"/>
+    <dgm:cxn modelId="{89B48E7C-72C0-4A90-A011-E8A975FE09CD}" type="presOf" srcId="{604A8E2C-557E-4D05-8E20-D365DEBA631A}" destId="{F13CCEE5-2092-48AA-836F-8C5B6A83EFEF}" srcOrd="0" destOrd="0" presId="urn:microsoft.com/office/officeart/2005/8/layout/default"/>
+    <dgm:cxn modelId="{44081B7D-A915-4F30-B187-6306D3678CB6}" type="presOf" srcId="{545BC824-6181-4CA1-82E5-53DD81752149}" destId="{D2D37EEF-8767-427D-BF99-23DC946B5378}" srcOrd="0" destOrd="0" presId="urn:microsoft.com/office/officeart/2005/8/layout/default"/>
+    <dgm:cxn modelId="{9A18A694-FA3C-4A6A-966D-483B3053A588}" srcId="{7C0767F4-49A8-4C1D-9FAC-3BC49D08218E}" destId="{8C292CDF-2DE1-4236-B899-38BF4672A29D}" srcOrd="4" destOrd="0" parTransId="{2C16F9AA-1B1D-42E0-A6B3-32D6A0154F7E}" sibTransId="{C0E3F6E3-B24A-4E3E-BAB7-E3BF6F1C5F3A}"/>
+    <dgm:cxn modelId="{9381D498-56EB-42B8-9D72-F4301A0B892D}" srcId="{7C0767F4-49A8-4C1D-9FAC-3BC49D08218E}" destId="{9D494315-3D3B-4018-B189-6DCB18156986}" srcOrd="3" destOrd="0" parTransId="{C4E92B66-4362-4C26-A4DF-FF74C8DEEB20}" sibTransId="{221D5FC9-41AE-4FAB-AF2F-4A186072081A}"/>
+    <dgm:cxn modelId="{DD581AC7-0C64-4BB4-8200-0E5E7E6F3CE9}" srcId="{7C0767F4-49A8-4C1D-9FAC-3BC49D08218E}" destId="{604A8E2C-557E-4D05-8E20-D365DEBA631A}" srcOrd="2" destOrd="0" parTransId="{5647B031-1983-44BD-960E-452E61D30734}" sibTransId="{4019C53A-F400-457E-83E5-901B509A72F0}"/>
+    <dgm:cxn modelId="{B3F972CA-A22A-4894-BEA9-06E9F635A0CB}" type="presOf" srcId="{C807BCD1-4BB0-49F9-B14B-EC16E66331D6}" destId="{FA2DDB49-5997-4894-B0F0-224F3A5D3841}" srcOrd="0" destOrd="0" presId="urn:microsoft.com/office/officeart/2005/8/layout/default"/>
+    <dgm:cxn modelId="{3ECCECDB-9617-4EB7-AAD2-A6599E6087B9}" type="presOf" srcId="{B2FF2244-25BF-4822-86C9-58B73A90BF97}" destId="{CE139165-265D-4BB4-9ADB-327EEFC6E7F5}" srcOrd="0" destOrd="0" presId="urn:microsoft.com/office/officeart/2005/8/layout/default"/>
+    <dgm:cxn modelId="{4FF7C5E9-9DC3-4EA5-8FAE-8B6995018ACE}" srcId="{7C0767F4-49A8-4C1D-9FAC-3BC49D08218E}" destId="{545BC824-6181-4CA1-82E5-53DD81752149}" srcOrd="0" destOrd="0" parTransId="{ACF386FC-FFFA-4BC7-84C7-E5875848454F}" sibTransId="{DEB0E6D2-D714-4D02-A926-5D0BEB0E678A}"/>
+    <dgm:cxn modelId="{7EFB1CF2-CF1E-4711-9F72-FA15E90827B0}" srcId="{7C0767F4-49A8-4C1D-9FAC-3BC49D08218E}" destId="{A852D13A-7023-4AD1-AA89-1D32F7B0FC6C}" srcOrd="5" destOrd="0" parTransId="{05802833-ABE9-47E0-9198-AB80D5D49278}" sibTransId="{E495C62C-306B-4582-A9A3-03418EDE54BC}"/>
+    <dgm:cxn modelId="{89BE9AFC-EF28-40FA-AF9A-EF0BA242CE32}" type="presOf" srcId="{A852D13A-7023-4AD1-AA89-1D32F7B0FC6C}" destId="{37A2C711-6FE3-48F1-9D79-308AD2E326E5}" srcOrd="0" destOrd="0" presId="urn:microsoft.com/office/officeart/2005/8/layout/default"/>
+    <dgm:cxn modelId="{763F2FFE-03EA-4960-83BD-7A3C5E69DED8}" type="presOf" srcId="{1105ADA4-8770-4C84-9C71-DCE71A12CDD4}" destId="{A477DE5B-A060-41E7-9103-8E59E56504C9}" srcOrd="0" destOrd="0" presId="urn:microsoft.com/office/officeart/2005/8/layout/default"/>
+    <dgm:cxn modelId="{66CF70D3-39A2-488F-8E56-E719091AB457}" type="presParOf" srcId="{2BDFC1B1-AA42-4E54-A320-42CEF235D817}" destId="{D2D37EEF-8767-427D-BF99-23DC946B5378}" srcOrd="0" destOrd="0" presId="urn:microsoft.com/office/officeart/2005/8/layout/default"/>
+    <dgm:cxn modelId="{23ACB7DC-3D58-4895-ADD4-6609189CD7C2}" type="presParOf" srcId="{2BDFC1B1-AA42-4E54-A320-42CEF235D817}" destId="{E871252D-F1FD-491C-9729-C0B2091AAA7A}" srcOrd="1" destOrd="0" presId="urn:microsoft.com/office/officeart/2005/8/layout/default"/>
+    <dgm:cxn modelId="{C7824828-D9CD-4E58-B8B4-4F7F1104B8EC}" type="presParOf" srcId="{2BDFC1B1-AA42-4E54-A320-42CEF235D817}" destId="{CE139165-265D-4BB4-9ADB-327EEFC6E7F5}" srcOrd="2" destOrd="0" presId="urn:microsoft.com/office/officeart/2005/8/layout/default"/>
+    <dgm:cxn modelId="{DB0BA27C-7B65-4712-AA30-CC94FC4311C9}" type="presParOf" srcId="{2BDFC1B1-AA42-4E54-A320-42CEF235D817}" destId="{80F173D3-183E-4E14-9F46-C0AF583102BA}" srcOrd="3" destOrd="0" presId="urn:microsoft.com/office/officeart/2005/8/layout/default"/>
+    <dgm:cxn modelId="{BD45B1D2-552B-4549-9E7A-C6389E6A1761}" type="presParOf" srcId="{2BDFC1B1-AA42-4E54-A320-42CEF235D817}" destId="{F13CCEE5-2092-48AA-836F-8C5B6A83EFEF}" srcOrd="4" destOrd="0" presId="urn:microsoft.com/office/officeart/2005/8/layout/default"/>
+    <dgm:cxn modelId="{7BBC0949-3F01-4B1B-BE1B-005C0E3536AF}" type="presParOf" srcId="{2BDFC1B1-AA42-4E54-A320-42CEF235D817}" destId="{639CD596-1132-4F67-8B20-14662FFE1B0D}" srcOrd="5" destOrd="0" presId="urn:microsoft.com/office/officeart/2005/8/layout/default"/>
+    <dgm:cxn modelId="{6EC12370-8C81-4271-8B77-8D904DC92968}" type="presParOf" srcId="{2BDFC1B1-AA42-4E54-A320-42CEF235D817}" destId="{FC7D108C-9EAC-498F-93A8-382E3C259395}" srcOrd="6" destOrd="0" presId="urn:microsoft.com/office/officeart/2005/8/layout/default"/>
+    <dgm:cxn modelId="{375C9078-3C47-4B6B-A707-1158AD22A634}" type="presParOf" srcId="{2BDFC1B1-AA42-4E54-A320-42CEF235D817}" destId="{026FC7D9-52D9-468A-A2CB-6ED3B992653D}" srcOrd="7" destOrd="0" presId="urn:microsoft.com/office/officeart/2005/8/layout/default"/>
+    <dgm:cxn modelId="{D9AFE2BB-F0C6-45AE-BFD0-8E95A1DD86E8}" type="presParOf" srcId="{2BDFC1B1-AA42-4E54-A320-42CEF235D817}" destId="{7909ABF9-0D9E-4E6B-B3E1-21B230154AFD}" srcOrd="8" destOrd="0" presId="urn:microsoft.com/office/officeart/2005/8/layout/default"/>
+    <dgm:cxn modelId="{45E4265A-0F88-499C-9A94-50BDAFD43FCA}" type="presParOf" srcId="{2BDFC1B1-AA42-4E54-A320-42CEF235D817}" destId="{255E9E52-5D5A-4D17-9F04-6E27C3C7B35F}" srcOrd="9" destOrd="0" presId="urn:microsoft.com/office/officeart/2005/8/layout/default"/>
+    <dgm:cxn modelId="{7A0295D5-0537-4B39-B6BB-9F073DBEE8AC}" type="presParOf" srcId="{2BDFC1B1-AA42-4E54-A320-42CEF235D817}" destId="{37A2C711-6FE3-48F1-9D79-308AD2E326E5}" srcOrd="10" destOrd="0" presId="urn:microsoft.com/office/officeart/2005/8/layout/default"/>
+    <dgm:cxn modelId="{8F477B3B-9F0B-4742-84E2-BFC236BBD50F}" type="presParOf" srcId="{2BDFC1B1-AA42-4E54-A320-42CEF235D817}" destId="{EAE82ABC-A82C-45F4-8D41-C7CEF12F8927}" srcOrd="11" destOrd="0" presId="urn:microsoft.com/office/officeart/2005/8/layout/default"/>
+    <dgm:cxn modelId="{6A9247A9-8E37-4852-BDDA-B52D2EE68F5D}" type="presParOf" srcId="{2BDFC1B1-AA42-4E54-A320-42CEF235D817}" destId="{FA2DDB49-5997-4894-B0F0-224F3A5D3841}" srcOrd="12" destOrd="0" presId="urn:microsoft.com/office/officeart/2005/8/layout/default"/>
+    <dgm:cxn modelId="{FFE6D6CA-3DAF-45E3-81B3-1ED88E11D30C}" type="presParOf" srcId="{2BDFC1B1-AA42-4E54-A320-42CEF235D817}" destId="{70D323CB-5572-4135-A977-E219707E667D}" srcOrd="13" destOrd="0" presId="urn:microsoft.com/office/officeart/2005/8/layout/default"/>
+    <dgm:cxn modelId="{5A8E8071-1E9E-4E40-BE1B-4605BA2B11BC}" type="presParOf" srcId="{2BDFC1B1-AA42-4E54-A320-42CEF235D817}" destId="{A477DE5B-A060-41E7-9103-8E59E56504C9}" srcOrd="14" destOrd="0" presId="urn:microsoft.com/office/officeart/2005/8/layout/default"/>
   </dgm:cxnLst>
   <dgm:bg/>
   <dgm:whole/>
@@ -11540,6 +12768,665 @@
 </dsp:drawing>
 </file>
 
+<file path=ppt/diagrams/drawing8.xml><?xml version="1.0" encoding="utf-8"?>
+<dsp:drawing xmlns:dgm="http://schemas.openxmlformats.org/drawingml/2006/diagram" xmlns:dsp="http://schemas.microsoft.com/office/drawing/2008/diagram" xmlns:a="http://schemas.openxmlformats.org/drawingml/2006/main">
+  <dsp:spTree>
+    <dsp:nvGrpSpPr>
+      <dsp:cNvPr id="0" name=""/>
+      <dsp:cNvGrpSpPr/>
+    </dsp:nvGrpSpPr>
+    <dsp:grpSpPr/>
+    <dsp:sp modelId="{D2D37EEF-8767-427D-BF99-23DC946B5378}">
+      <dsp:nvSpPr>
+        <dsp:cNvPr id="0" name=""/>
+        <dsp:cNvSpPr/>
+      </dsp:nvSpPr>
+      <dsp:spPr>
+        <a:xfrm>
+          <a:off x="2946" y="491797"/>
+          <a:ext cx="2337792" cy="1402675"/>
+        </a:xfrm>
+        <a:prstGeom prst="rect">
+          <a:avLst/>
+        </a:prstGeom>
+        <a:solidFill>
+          <a:schemeClr val="accent1">
+            <a:hueOff val="0"/>
+            <a:satOff val="0"/>
+            <a:lumOff val="0"/>
+            <a:alphaOff val="0"/>
+          </a:schemeClr>
+        </a:solidFill>
+        <a:ln w="15875" cap="flat" cmpd="sng" algn="ctr">
+          <a:solidFill>
+            <a:schemeClr val="lt1">
+              <a:hueOff val="0"/>
+              <a:satOff val="0"/>
+              <a:lumOff val="0"/>
+              <a:alphaOff val="0"/>
+            </a:schemeClr>
+          </a:solidFill>
+          <a:prstDash val="solid"/>
+        </a:ln>
+        <a:effectLst/>
+      </dsp:spPr>
+      <dsp:style>
+        <a:lnRef idx="2">
+          <a:scrgbClr r="0" g="0" b="0"/>
+        </a:lnRef>
+        <a:fillRef idx="1">
+          <a:scrgbClr r="0" g="0" b="0"/>
+        </a:fillRef>
+        <a:effectRef idx="0">
+          <a:scrgbClr r="0" g="0" b="0"/>
+        </a:effectRef>
+        <a:fontRef idx="minor">
+          <a:schemeClr val="lt1"/>
+        </a:fontRef>
+      </dsp:style>
+      <dsp:txBody>
+        <a:bodyPr spcFirstLastPara="0" vert="horz" wrap="square" lIns="38100" tIns="38100" rIns="38100" bIns="38100" numCol="1" spcCol="1270" anchor="ctr" anchorCtr="0">
+          <a:noAutofit/>
+        </a:bodyPr>
+        <a:lstStyle/>
+        <a:p>
+          <a:pPr marL="0" lvl="0" indent="0" algn="ctr" defTabSz="444500">
+            <a:lnSpc>
+              <a:spcPct val="90000"/>
+            </a:lnSpc>
+            <a:spcBef>
+              <a:spcPct val="0"/>
+            </a:spcBef>
+            <a:spcAft>
+              <a:spcPct val="35000"/>
+            </a:spcAft>
+            <a:buNone/>
+          </a:pPr>
+          <a:r>
+            <a:rPr lang="de-DE" sz="1000" kern="1200" dirty="0"/>
+            <a:t>8.1: Als Kunde möchte ich an meiner Zahlungsanweisung einen Zweck eingeben können, um einen besseren Überblick über meine Geldströme zu erhalten.</a:t>
+          </a:r>
+          <a:endParaRPr lang="en-US" sz="1000" kern="1200" dirty="0"/>
+        </a:p>
+      </dsp:txBody>
+      <dsp:txXfrm>
+        <a:off x="2946" y="491797"/>
+        <a:ext cx="2337792" cy="1402675"/>
+      </dsp:txXfrm>
+    </dsp:sp>
+    <dsp:sp modelId="{CE139165-265D-4BB4-9ADB-327EEFC6E7F5}">
+      <dsp:nvSpPr>
+        <dsp:cNvPr id="0" name=""/>
+        <dsp:cNvSpPr/>
+      </dsp:nvSpPr>
+      <dsp:spPr>
+        <a:xfrm>
+          <a:off x="2574518" y="491797"/>
+          <a:ext cx="2337792" cy="1402675"/>
+        </a:xfrm>
+        <a:prstGeom prst="rect">
+          <a:avLst/>
+        </a:prstGeom>
+        <a:solidFill>
+          <a:schemeClr val="accent1">
+            <a:hueOff val="0"/>
+            <a:satOff val="0"/>
+            <a:lumOff val="0"/>
+            <a:alphaOff val="0"/>
+          </a:schemeClr>
+        </a:solidFill>
+        <a:ln w="15875" cap="flat" cmpd="sng" algn="ctr">
+          <a:solidFill>
+            <a:schemeClr val="lt1">
+              <a:hueOff val="0"/>
+              <a:satOff val="0"/>
+              <a:lumOff val="0"/>
+              <a:alphaOff val="0"/>
+            </a:schemeClr>
+          </a:solidFill>
+          <a:prstDash val="solid"/>
+        </a:ln>
+        <a:effectLst/>
+      </dsp:spPr>
+      <dsp:style>
+        <a:lnRef idx="2">
+          <a:scrgbClr r="0" g="0" b="0"/>
+        </a:lnRef>
+        <a:fillRef idx="1">
+          <a:scrgbClr r="0" g="0" b="0"/>
+        </a:fillRef>
+        <a:effectRef idx="0">
+          <a:scrgbClr r="0" g="0" b="0"/>
+        </a:effectRef>
+        <a:fontRef idx="minor">
+          <a:schemeClr val="lt1"/>
+        </a:fontRef>
+      </dsp:style>
+      <dsp:txBody>
+        <a:bodyPr spcFirstLastPara="0" vert="horz" wrap="square" lIns="38100" tIns="38100" rIns="38100" bIns="38100" numCol="1" spcCol="1270" anchor="ctr" anchorCtr="0">
+          <a:noAutofit/>
+        </a:bodyPr>
+        <a:lstStyle/>
+        <a:p>
+          <a:pPr marL="0" lvl="0" indent="0" algn="ctr" defTabSz="444500">
+            <a:lnSpc>
+              <a:spcPct val="90000"/>
+            </a:lnSpc>
+            <a:spcBef>
+              <a:spcPct val="0"/>
+            </a:spcBef>
+            <a:spcAft>
+              <a:spcPct val="35000"/>
+            </a:spcAft>
+            <a:buNone/>
+          </a:pPr>
+          <a:r>
+            <a:rPr lang="de-DE" sz="1000" kern="1200" dirty="0"/>
+            <a:t>8.2: Als Kunde möchte ich über die Weboberfläche einen Nutzeraccount anlegen, um auf die Dienste der </a:t>
+          </a:r>
+          <a:r>
+            <a:rPr lang="de-DE" sz="1000" kern="1200" dirty="0" err="1"/>
+            <a:t>BuggyBank</a:t>
+          </a:r>
+          <a:r>
+            <a:rPr lang="de-DE" sz="1000" kern="1200" dirty="0"/>
+            <a:t> zugreifen zu können.</a:t>
+          </a:r>
+          <a:endParaRPr lang="en-US" sz="1000" kern="1200" dirty="0"/>
+        </a:p>
+      </dsp:txBody>
+      <dsp:txXfrm>
+        <a:off x="2574518" y="491797"/>
+        <a:ext cx="2337792" cy="1402675"/>
+      </dsp:txXfrm>
+    </dsp:sp>
+    <dsp:sp modelId="{F13CCEE5-2092-48AA-836F-8C5B6A83EFEF}">
+      <dsp:nvSpPr>
+        <dsp:cNvPr id="0" name=""/>
+        <dsp:cNvSpPr/>
+      </dsp:nvSpPr>
+      <dsp:spPr>
+        <a:xfrm>
+          <a:off x="5146089" y="491797"/>
+          <a:ext cx="2337792" cy="1402675"/>
+        </a:xfrm>
+        <a:prstGeom prst="rect">
+          <a:avLst/>
+        </a:prstGeom>
+        <a:solidFill>
+          <a:schemeClr val="accent1">
+            <a:hueOff val="0"/>
+            <a:satOff val="0"/>
+            <a:lumOff val="0"/>
+            <a:alphaOff val="0"/>
+          </a:schemeClr>
+        </a:solidFill>
+        <a:ln w="15875" cap="flat" cmpd="sng" algn="ctr">
+          <a:solidFill>
+            <a:schemeClr val="lt1">
+              <a:hueOff val="0"/>
+              <a:satOff val="0"/>
+              <a:lumOff val="0"/>
+              <a:alphaOff val="0"/>
+            </a:schemeClr>
+          </a:solidFill>
+          <a:prstDash val="solid"/>
+        </a:ln>
+        <a:effectLst/>
+      </dsp:spPr>
+      <dsp:style>
+        <a:lnRef idx="2">
+          <a:scrgbClr r="0" g="0" b="0"/>
+        </a:lnRef>
+        <a:fillRef idx="1">
+          <a:scrgbClr r="0" g="0" b="0"/>
+        </a:fillRef>
+        <a:effectRef idx="0">
+          <a:scrgbClr r="0" g="0" b="0"/>
+        </a:effectRef>
+        <a:fontRef idx="minor">
+          <a:schemeClr val="lt1"/>
+        </a:fontRef>
+      </dsp:style>
+      <dsp:txBody>
+        <a:bodyPr spcFirstLastPara="0" vert="horz" wrap="square" lIns="38100" tIns="38100" rIns="38100" bIns="38100" numCol="1" spcCol="1270" anchor="ctr" anchorCtr="0">
+          <a:noAutofit/>
+        </a:bodyPr>
+        <a:lstStyle/>
+        <a:p>
+          <a:pPr marL="0" lvl="0" indent="0" algn="ctr" defTabSz="444500">
+            <a:lnSpc>
+              <a:spcPct val="90000"/>
+            </a:lnSpc>
+            <a:spcBef>
+              <a:spcPct val="0"/>
+            </a:spcBef>
+            <a:spcAft>
+              <a:spcPct val="35000"/>
+            </a:spcAft>
+            <a:buNone/>
+          </a:pPr>
+          <a:r>
+            <a:rPr lang="de-DE" sz="1000" kern="1200" dirty="0"/>
+            <a:t>8.3: Als Kunde möchte ich über die Weboberfläche Konten anlegen, um dafür nicht zur Filiale laufen zu müssen.</a:t>
+          </a:r>
+          <a:endParaRPr lang="en-US" sz="1000" kern="1200" dirty="0"/>
+        </a:p>
+      </dsp:txBody>
+      <dsp:txXfrm>
+        <a:off x="5146089" y="491797"/>
+        <a:ext cx="2337792" cy="1402675"/>
+      </dsp:txXfrm>
+    </dsp:sp>
+    <dsp:sp modelId="{FC7D108C-9EAC-498F-93A8-382E3C259395}">
+      <dsp:nvSpPr>
+        <dsp:cNvPr id="0" name=""/>
+        <dsp:cNvSpPr/>
+      </dsp:nvSpPr>
+      <dsp:spPr>
+        <a:xfrm>
+          <a:off x="7717661" y="491797"/>
+          <a:ext cx="2337792" cy="1402675"/>
+        </a:xfrm>
+        <a:prstGeom prst="rect">
+          <a:avLst/>
+        </a:prstGeom>
+        <a:solidFill>
+          <a:schemeClr val="accent1">
+            <a:hueOff val="0"/>
+            <a:satOff val="0"/>
+            <a:lumOff val="0"/>
+            <a:alphaOff val="0"/>
+          </a:schemeClr>
+        </a:solidFill>
+        <a:ln w="15875" cap="flat" cmpd="sng" algn="ctr">
+          <a:solidFill>
+            <a:schemeClr val="lt1">
+              <a:hueOff val="0"/>
+              <a:satOff val="0"/>
+              <a:lumOff val="0"/>
+              <a:alphaOff val="0"/>
+            </a:schemeClr>
+          </a:solidFill>
+          <a:prstDash val="solid"/>
+        </a:ln>
+        <a:effectLst/>
+      </dsp:spPr>
+      <dsp:style>
+        <a:lnRef idx="2">
+          <a:scrgbClr r="0" g="0" b="0"/>
+        </a:lnRef>
+        <a:fillRef idx="1">
+          <a:scrgbClr r="0" g="0" b="0"/>
+        </a:fillRef>
+        <a:effectRef idx="0">
+          <a:scrgbClr r="0" g="0" b="0"/>
+        </a:effectRef>
+        <a:fontRef idx="minor">
+          <a:schemeClr val="lt1"/>
+        </a:fontRef>
+      </dsp:style>
+      <dsp:txBody>
+        <a:bodyPr spcFirstLastPara="0" vert="horz" wrap="square" lIns="38100" tIns="38100" rIns="38100" bIns="38100" numCol="1" spcCol="1270" anchor="ctr" anchorCtr="0">
+          <a:noAutofit/>
+        </a:bodyPr>
+        <a:lstStyle/>
+        <a:p>
+          <a:pPr marL="0" lvl="0" indent="0" algn="ctr" defTabSz="444500">
+            <a:lnSpc>
+              <a:spcPct val="90000"/>
+            </a:lnSpc>
+            <a:spcBef>
+              <a:spcPct val="0"/>
+            </a:spcBef>
+            <a:spcAft>
+              <a:spcPct val="35000"/>
+            </a:spcAft>
+            <a:buNone/>
+          </a:pPr>
+          <a:r>
+            <a:rPr lang="de-DE" sz="1000" kern="1200" dirty="0"/>
+            <a:t>8.4: Als Kunde möchte ich meinen Konten einen Namen geben können, um z.B. mein Sparkonto von meinem Girokonto zu unterscheiden.</a:t>
+          </a:r>
+          <a:endParaRPr lang="en-US" sz="1000" kern="1200" dirty="0"/>
+        </a:p>
+      </dsp:txBody>
+      <dsp:txXfrm>
+        <a:off x="7717661" y="491797"/>
+        <a:ext cx="2337792" cy="1402675"/>
+      </dsp:txXfrm>
+    </dsp:sp>
+    <dsp:sp modelId="{7909ABF9-0D9E-4E6B-B3E1-21B230154AFD}">
+      <dsp:nvSpPr>
+        <dsp:cNvPr id="0" name=""/>
+        <dsp:cNvSpPr/>
+      </dsp:nvSpPr>
+      <dsp:spPr>
+        <a:xfrm>
+          <a:off x="2946" y="2128252"/>
+          <a:ext cx="2337792" cy="1402675"/>
+        </a:xfrm>
+        <a:prstGeom prst="rect">
+          <a:avLst/>
+        </a:prstGeom>
+        <a:solidFill>
+          <a:schemeClr val="accent1">
+            <a:hueOff val="0"/>
+            <a:satOff val="0"/>
+            <a:lumOff val="0"/>
+            <a:alphaOff val="0"/>
+          </a:schemeClr>
+        </a:solidFill>
+        <a:ln w="15875" cap="flat" cmpd="sng" algn="ctr">
+          <a:solidFill>
+            <a:schemeClr val="lt1">
+              <a:hueOff val="0"/>
+              <a:satOff val="0"/>
+              <a:lumOff val="0"/>
+              <a:alphaOff val="0"/>
+            </a:schemeClr>
+          </a:solidFill>
+          <a:prstDash val="solid"/>
+        </a:ln>
+        <a:effectLst/>
+      </dsp:spPr>
+      <dsp:style>
+        <a:lnRef idx="2">
+          <a:scrgbClr r="0" g="0" b="0"/>
+        </a:lnRef>
+        <a:fillRef idx="1">
+          <a:scrgbClr r="0" g="0" b="0"/>
+        </a:fillRef>
+        <a:effectRef idx="0">
+          <a:scrgbClr r="0" g="0" b="0"/>
+        </a:effectRef>
+        <a:fontRef idx="minor">
+          <a:schemeClr val="lt1"/>
+        </a:fontRef>
+      </dsp:style>
+      <dsp:txBody>
+        <a:bodyPr spcFirstLastPara="0" vert="horz" wrap="square" lIns="38100" tIns="38100" rIns="38100" bIns="38100" numCol="1" spcCol="1270" anchor="ctr" anchorCtr="0">
+          <a:noAutofit/>
+        </a:bodyPr>
+        <a:lstStyle/>
+        <a:p>
+          <a:pPr marL="0" lvl="0" indent="0" algn="ctr" defTabSz="444500">
+            <a:lnSpc>
+              <a:spcPct val="90000"/>
+            </a:lnSpc>
+            <a:spcBef>
+              <a:spcPct val="0"/>
+            </a:spcBef>
+            <a:spcAft>
+              <a:spcPct val="35000"/>
+            </a:spcAft>
+            <a:buNone/>
+          </a:pPr>
+          <a:r>
+            <a:rPr lang="de-DE" sz="1000" kern="1200" dirty="0"/>
+            <a:t>8.5: Als Geschäftsführer möchte ich den Kunden Überweisungen an andere Banken ermöglichen, um ihnen die Zahlungsvorgänge zu erleichtern. Die ersten vier Stellen einer Kontonummer sind die Bankleitzahl (bei uns 1234).</a:t>
+          </a:r>
+          <a:br>
+            <a:rPr lang="de-DE" sz="1000" kern="1200" dirty="0"/>
+          </a:br>
+          <a:r>
+            <a:rPr lang="de-DE" sz="1000" kern="1200" dirty="0"/>
+            <a:t>Wird eine Überweisung an eine andere Bank angewiesen, buchen wir intern auf das Konto 000.</a:t>
+          </a:r>
+          <a:endParaRPr lang="en-US" sz="1000" kern="1200" dirty="0"/>
+        </a:p>
+      </dsp:txBody>
+      <dsp:txXfrm>
+        <a:off x="2946" y="2128252"/>
+        <a:ext cx="2337792" cy="1402675"/>
+      </dsp:txXfrm>
+    </dsp:sp>
+    <dsp:sp modelId="{37A2C711-6FE3-48F1-9D79-308AD2E326E5}">
+      <dsp:nvSpPr>
+        <dsp:cNvPr id="0" name=""/>
+        <dsp:cNvSpPr/>
+      </dsp:nvSpPr>
+      <dsp:spPr>
+        <a:xfrm>
+          <a:off x="2574518" y="2128252"/>
+          <a:ext cx="2337792" cy="1402675"/>
+        </a:xfrm>
+        <a:prstGeom prst="rect">
+          <a:avLst/>
+        </a:prstGeom>
+        <a:solidFill>
+          <a:schemeClr val="accent1">
+            <a:hueOff val="0"/>
+            <a:satOff val="0"/>
+            <a:lumOff val="0"/>
+            <a:alphaOff val="0"/>
+          </a:schemeClr>
+        </a:solidFill>
+        <a:ln w="15875" cap="flat" cmpd="sng" algn="ctr">
+          <a:solidFill>
+            <a:schemeClr val="lt1">
+              <a:hueOff val="0"/>
+              <a:satOff val="0"/>
+              <a:lumOff val="0"/>
+              <a:alphaOff val="0"/>
+            </a:schemeClr>
+          </a:solidFill>
+          <a:prstDash val="solid"/>
+        </a:ln>
+        <a:effectLst/>
+      </dsp:spPr>
+      <dsp:style>
+        <a:lnRef idx="2">
+          <a:scrgbClr r="0" g="0" b="0"/>
+        </a:lnRef>
+        <a:fillRef idx="1">
+          <a:scrgbClr r="0" g="0" b="0"/>
+        </a:fillRef>
+        <a:effectRef idx="0">
+          <a:scrgbClr r="0" g="0" b="0"/>
+        </a:effectRef>
+        <a:fontRef idx="minor">
+          <a:schemeClr val="lt1"/>
+        </a:fontRef>
+      </dsp:style>
+      <dsp:txBody>
+        <a:bodyPr spcFirstLastPara="0" vert="horz" wrap="square" lIns="38100" tIns="38100" rIns="38100" bIns="38100" numCol="1" spcCol="1270" anchor="ctr" anchorCtr="0">
+          <a:noAutofit/>
+        </a:bodyPr>
+        <a:lstStyle/>
+        <a:p>
+          <a:pPr marL="0" lvl="0" indent="0" algn="ctr" defTabSz="444500">
+            <a:lnSpc>
+              <a:spcPct val="90000"/>
+            </a:lnSpc>
+            <a:spcBef>
+              <a:spcPct val="0"/>
+            </a:spcBef>
+            <a:spcAft>
+              <a:spcPct val="35000"/>
+            </a:spcAft>
+            <a:buNone/>
+          </a:pPr>
+          <a:r>
+            <a:rPr lang="de-DE" sz="1000" kern="1200" dirty="0"/>
+            <a:t>8.6: Als Bürosachbearbeiter möchte ich das Sonderkonto 000 nicht mit in der Kontoübersicht anzeigen. Stattdessen soll es auf der Kontoübersicht separat angezeigt werden, um die Geldbestände der Kunden und der Bank getrennt sehen zu können.</a:t>
+          </a:r>
+          <a:endParaRPr lang="en-US" sz="1000" kern="1200" dirty="0"/>
+        </a:p>
+      </dsp:txBody>
+      <dsp:txXfrm>
+        <a:off x="2574518" y="2128252"/>
+        <a:ext cx="2337792" cy="1402675"/>
+      </dsp:txXfrm>
+    </dsp:sp>
+    <dsp:sp modelId="{FA2DDB49-5997-4894-B0F0-224F3A5D3841}">
+      <dsp:nvSpPr>
+        <dsp:cNvPr id="0" name=""/>
+        <dsp:cNvSpPr/>
+      </dsp:nvSpPr>
+      <dsp:spPr>
+        <a:xfrm>
+          <a:off x="5146089" y="2128252"/>
+          <a:ext cx="2337792" cy="1402675"/>
+        </a:xfrm>
+        <a:prstGeom prst="rect">
+          <a:avLst/>
+        </a:prstGeom>
+        <a:solidFill>
+          <a:schemeClr val="accent1">
+            <a:hueOff val="0"/>
+            <a:satOff val="0"/>
+            <a:lumOff val="0"/>
+            <a:alphaOff val="0"/>
+          </a:schemeClr>
+        </a:solidFill>
+        <a:ln w="15875" cap="flat" cmpd="sng" algn="ctr">
+          <a:solidFill>
+            <a:schemeClr val="lt1">
+              <a:hueOff val="0"/>
+              <a:satOff val="0"/>
+              <a:lumOff val="0"/>
+              <a:alphaOff val="0"/>
+            </a:schemeClr>
+          </a:solidFill>
+          <a:prstDash val="solid"/>
+        </a:ln>
+        <a:effectLst/>
+      </dsp:spPr>
+      <dsp:style>
+        <a:lnRef idx="2">
+          <a:scrgbClr r="0" g="0" b="0"/>
+        </a:lnRef>
+        <a:fillRef idx="1">
+          <a:scrgbClr r="0" g="0" b="0"/>
+        </a:fillRef>
+        <a:effectRef idx="0">
+          <a:scrgbClr r="0" g="0" b="0"/>
+        </a:effectRef>
+        <a:fontRef idx="minor">
+          <a:schemeClr val="lt1"/>
+        </a:fontRef>
+      </dsp:style>
+      <dsp:txBody>
+        <a:bodyPr spcFirstLastPara="0" vert="horz" wrap="square" lIns="38100" tIns="38100" rIns="38100" bIns="38100" numCol="1" spcCol="1270" anchor="ctr" anchorCtr="0">
+          <a:noAutofit/>
+        </a:bodyPr>
+        <a:lstStyle/>
+        <a:p>
+          <a:pPr marL="0" lvl="0" indent="0" algn="ctr" defTabSz="444500">
+            <a:lnSpc>
+              <a:spcPct val="90000"/>
+            </a:lnSpc>
+            <a:spcBef>
+              <a:spcPct val="0"/>
+            </a:spcBef>
+            <a:spcAft>
+              <a:spcPct val="35000"/>
+            </a:spcAft>
+            <a:buNone/>
+          </a:pPr>
+          <a:r>
+            <a:rPr lang="de-DE" sz="1000" kern="1200" dirty="0"/>
+            <a:t>8.7: Als Kunde möchte ich die Anwendung in einer modernen, zeitgemäßen Aufmachung erleben, damit der Umgang mit der </a:t>
+          </a:r>
+          <a:r>
+            <a:rPr lang="de-DE" sz="1000" kern="1200" dirty="0" err="1"/>
+            <a:t>BuggyBank</a:t>
+          </a:r>
+          <a:r>
+            <a:rPr lang="de-DE" sz="1000" kern="1200" dirty="0"/>
+            <a:t> Spaß macht. Überraschen Sie mich!</a:t>
+          </a:r>
+          <a:endParaRPr lang="en-US" sz="1000" kern="1200" dirty="0"/>
+        </a:p>
+      </dsp:txBody>
+      <dsp:txXfrm>
+        <a:off x="5146089" y="2128252"/>
+        <a:ext cx="2337792" cy="1402675"/>
+      </dsp:txXfrm>
+    </dsp:sp>
+    <dsp:sp modelId="{A477DE5B-A060-41E7-9103-8E59E56504C9}">
+      <dsp:nvSpPr>
+        <dsp:cNvPr id="0" name=""/>
+        <dsp:cNvSpPr/>
+      </dsp:nvSpPr>
+      <dsp:spPr>
+        <a:xfrm>
+          <a:off x="7717661" y="2128252"/>
+          <a:ext cx="2337792" cy="1402675"/>
+        </a:xfrm>
+        <a:prstGeom prst="rect">
+          <a:avLst/>
+        </a:prstGeom>
+        <a:solidFill>
+          <a:schemeClr val="accent1">
+            <a:hueOff val="0"/>
+            <a:satOff val="0"/>
+            <a:lumOff val="0"/>
+            <a:alphaOff val="0"/>
+          </a:schemeClr>
+        </a:solidFill>
+        <a:ln w="15875" cap="flat" cmpd="sng" algn="ctr">
+          <a:solidFill>
+            <a:schemeClr val="lt1">
+              <a:hueOff val="0"/>
+              <a:satOff val="0"/>
+              <a:lumOff val="0"/>
+              <a:alphaOff val="0"/>
+            </a:schemeClr>
+          </a:solidFill>
+          <a:prstDash val="solid"/>
+        </a:ln>
+        <a:effectLst/>
+      </dsp:spPr>
+      <dsp:style>
+        <a:lnRef idx="2">
+          <a:scrgbClr r="0" g="0" b="0"/>
+        </a:lnRef>
+        <a:fillRef idx="1">
+          <a:scrgbClr r="0" g="0" b="0"/>
+        </a:fillRef>
+        <a:effectRef idx="0">
+          <a:scrgbClr r="0" g="0" b="0"/>
+        </a:effectRef>
+        <a:fontRef idx="minor">
+          <a:schemeClr val="lt1"/>
+        </a:fontRef>
+      </dsp:style>
+      <dsp:txBody>
+        <a:bodyPr spcFirstLastPara="0" vert="horz" wrap="square" lIns="38100" tIns="38100" rIns="38100" bIns="38100" numCol="1" spcCol="1270" anchor="ctr" anchorCtr="0">
+          <a:noAutofit/>
+        </a:bodyPr>
+        <a:lstStyle/>
+        <a:p>
+          <a:pPr marL="0" lvl="0" indent="0" algn="ctr" defTabSz="444500">
+            <a:lnSpc>
+              <a:spcPct val="90000"/>
+            </a:lnSpc>
+            <a:spcBef>
+              <a:spcPct val="0"/>
+            </a:spcBef>
+            <a:spcAft>
+              <a:spcPct val="35000"/>
+            </a:spcAft>
+            <a:buNone/>
+          </a:pPr>
+          <a:r>
+            <a:rPr lang="de-DE" sz="1000" kern="1200" dirty="0"/>
+            <a:t>8.6: Als Kunde möchte ich eine Bestätigung auf dem Bildschirm erhalten, wenn ich eine Zahlung anweise, um sicher zu sein, dass die Zahlung auch durchgeführt wurde.</a:t>
+          </a:r>
+          <a:endParaRPr lang="en-US" sz="1000" kern="1200" dirty="0"/>
+        </a:p>
+      </dsp:txBody>
+      <dsp:txXfrm>
+        <a:off x="7717661" y="2128252"/>
+        <a:ext cx="2337792" cy="1402675"/>
+      </dsp:txXfrm>
+    </dsp:sp>
+  </dsp:spTree>
+</dsp:drawing>
+</file>
+
 <file path=ppt/diagrams/layout1.xml><?xml version="1.0" encoding="utf-8"?>
 <dgm:layoutDef xmlns:dgm="http://schemas.openxmlformats.org/drawingml/2006/diagram" xmlns:a="http://schemas.openxmlformats.org/drawingml/2006/main" uniqueId="urn:microsoft.com/office/officeart/2005/8/layout/default">
   <dgm:title val=""/>
@@ -12639,6 +14526,153 @@
 </dgm:layoutDef>
 </file>
 
+<file path=ppt/diagrams/layout8.xml><?xml version="1.0" encoding="utf-8"?>
+<dgm:layoutDef xmlns:dgm="http://schemas.openxmlformats.org/drawingml/2006/diagram" xmlns:a="http://schemas.openxmlformats.org/drawingml/2006/main" uniqueId="urn:microsoft.com/office/officeart/2005/8/layout/default">
+  <dgm:title val=""/>
+  <dgm:desc val=""/>
+  <dgm:catLst>
+    <dgm:cat type="list" pri="400"/>
+  </dgm:catLst>
+  <dgm:sampData>
+    <dgm:dataModel>
+      <dgm:ptLst>
+        <dgm:pt modelId="0" type="doc"/>
+        <dgm:pt modelId="1">
+          <dgm:prSet phldr="1"/>
+        </dgm:pt>
+        <dgm:pt modelId="2">
+          <dgm:prSet phldr="1"/>
+        </dgm:pt>
+        <dgm:pt modelId="3">
+          <dgm:prSet phldr="1"/>
+        </dgm:pt>
+        <dgm:pt modelId="4">
+          <dgm:prSet phldr="1"/>
+        </dgm:pt>
+        <dgm:pt modelId="5">
+          <dgm:prSet phldr="1"/>
+        </dgm:pt>
+      </dgm:ptLst>
+      <dgm:cxnLst>
+        <dgm:cxn modelId="6" srcId="0" destId="1" srcOrd="0" destOrd="0"/>
+        <dgm:cxn modelId="7" srcId="0" destId="2" srcOrd="1" destOrd="0"/>
+        <dgm:cxn modelId="8" srcId="0" destId="3" srcOrd="2" destOrd="0"/>
+        <dgm:cxn modelId="9" srcId="0" destId="4" srcOrd="3" destOrd="0"/>
+        <dgm:cxn modelId="10" srcId="0" destId="5" srcOrd="4" destOrd="0"/>
+      </dgm:cxnLst>
+      <dgm:bg/>
+      <dgm:whole/>
+    </dgm:dataModel>
+  </dgm:sampData>
+  <dgm:styleData>
+    <dgm:dataModel>
+      <dgm:ptLst>
+        <dgm:pt modelId="0" type="doc"/>
+        <dgm:pt modelId="1"/>
+        <dgm:pt modelId="2"/>
+      </dgm:ptLst>
+      <dgm:cxnLst>
+        <dgm:cxn modelId="3" srcId="0" destId="1" srcOrd="0" destOrd="0"/>
+        <dgm:cxn modelId="4" srcId="0" destId="2" srcOrd="1" destOrd="0"/>
+      </dgm:cxnLst>
+      <dgm:bg/>
+      <dgm:whole/>
+    </dgm:dataModel>
+  </dgm:styleData>
+  <dgm:clrData>
+    <dgm:dataModel>
+      <dgm:ptLst>
+        <dgm:pt modelId="0" type="doc"/>
+        <dgm:pt modelId="1"/>
+        <dgm:pt modelId="2"/>
+        <dgm:pt modelId="3"/>
+        <dgm:pt modelId="4"/>
+        <dgm:pt modelId="5"/>
+        <dgm:pt modelId="6"/>
+      </dgm:ptLst>
+      <dgm:cxnLst>
+        <dgm:cxn modelId="7" srcId="0" destId="1" srcOrd="0" destOrd="0"/>
+        <dgm:cxn modelId="8" srcId="0" destId="2" srcOrd="1" destOrd="0"/>
+        <dgm:cxn modelId="9" srcId="0" destId="3" srcOrd="2" destOrd="0"/>
+        <dgm:cxn modelId="10" srcId="0" destId="4" srcOrd="3" destOrd="0"/>
+        <dgm:cxn modelId="11" srcId="0" destId="5" srcOrd="4" destOrd="0"/>
+        <dgm:cxn modelId="12" srcId="0" destId="6" srcOrd="5" destOrd="0"/>
+      </dgm:cxnLst>
+      <dgm:bg/>
+      <dgm:whole/>
+    </dgm:dataModel>
+  </dgm:clrData>
+  <dgm:layoutNode name="diagram">
+    <dgm:varLst>
+      <dgm:dir/>
+      <dgm:resizeHandles val="exact"/>
+    </dgm:varLst>
+    <dgm:choose name="Name0">
+      <dgm:if name="Name1" func="var" arg="dir" op="equ" val="norm">
+        <dgm:alg type="snake">
+          <dgm:param type="grDir" val="tL"/>
+          <dgm:param type="flowDir" val="row"/>
+          <dgm:param type="contDir" val="sameDir"/>
+          <dgm:param type="off" val="ctr"/>
+        </dgm:alg>
+      </dgm:if>
+      <dgm:else name="Name2">
+        <dgm:alg type="snake">
+          <dgm:param type="grDir" val="tR"/>
+          <dgm:param type="flowDir" val="row"/>
+          <dgm:param type="contDir" val="sameDir"/>
+          <dgm:param type="off" val="ctr"/>
+        </dgm:alg>
+      </dgm:else>
+    </dgm:choose>
+    <dgm:shape xmlns:r="http://schemas.openxmlformats.org/officeDocument/2006/relationships" r:blip="">
+      <dgm:adjLst/>
+    </dgm:shape>
+    <dgm:presOf/>
+    <dgm:constrLst>
+      <dgm:constr type="w" for="ch" forName="node" refType="w"/>
+      <dgm:constr type="h" for="ch" forName="node" refType="w" refFor="ch" refForName="node" fact="0.6"/>
+      <dgm:constr type="w" for="ch" forName="sibTrans" refType="w" refFor="ch" refForName="node" fact="0.1"/>
+      <dgm:constr type="sp" refType="w" refFor="ch" refForName="sibTrans"/>
+      <dgm:constr type="primFontSz" for="ch" forName="node" op="equ" val="65"/>
+    </dgm:constrLst>
+    <dgm:ruleLst/>
+    <dgm:forEach name="Name3" axis="ch" ptType="node">
+      <dgm:layoutNode name="node">
+        <dgm:varLst>
+          <dgm:bulletEnabled val="1"/>
+        </dgm:varLst>
+        <dgm:alg type="tx"/>
+        <dgm:shape xmlns:r="http://schemas.openxmlformats.org/officeDocument/2006/relationships" type="rect" r:blip="">
+          <dgm:adjLst/>
+        </dgm:shape>
+        <dgm:presOf axis="desOrSelf" ptType="node"/>
+        <dgm:constrLst>
+          <dgm:constr type="lMarg" refType="primFontSz" fact="0.3"/>
+          <dgm:constr type="rMarg" refType="primFontSz" fact="0.3"/>
+          <dgm:constr type="tMarg" refType="primFontSz" fact="0.3"/>
+          <dgm:constr type="bMarg" refType="primFontSz" fact="0.3"/>
+        </dgm:constrLst>
+        <dgm:ruleLst>
+          <dgm:rule type="primFontSz" val="5" fact="NaN" max="NaN"/>
+        </dgm:ruleLst>
+      </dgm:layoutNode>
+      <dgm:forEach name="Name4" axis="followSib" ptType="sibTrans" cnt="1">
+        <dgm:layoutNode name="sibTrans">
+          <dgm:alg type="sp"/>
+          <dgm:shape xmlns:r="http://schemas.openxmlformats.org/officeDocument/2006/relationships" r:blip="">
+            <dgm:adjLst/>
+          </dgm:shape>
+          <dgm:presOf/>
+          <dgm:constrLst/>
+          <dgm:ruleLst/>
+        </dgm:layoutNode>
+      </dgm:forEach>
+    </dgm:forEach>
+  </dgm:layoutNode>
+</dgm:layoutDef>
+</file>
+
 <file path=ppt/diagrams/quickStyle1.xml><?xml version="1.0" encoding="utf-8"?>
 <dgm:styleDef xmlns:dgm="http://schemas.openxmlformats.org/drawingml/2006/diagram" xmlns:a="http://schemas.openxmlformats.org/drawingml/2006/main" uniqueId="urn:microsoft.com/office/officeart/2005/8/quickstyle/simple1">
   <dgm:title val=""/>
@@ -18844,6 +20878,1040 @@
 </file>
 
 <file path=ppt/diagrams/quickStyle7.xml><?xml version="1.0" encoding="utf-8"?>
+<dgm:styleDef xmlns:dgm="http://schemas.openxmlformats.org/drawingml/2006/diagram" xmlns:a="http://schemas.openxmlformats.org/drawingml/2006/main" uniqueId="urn:microsoft.com/office/officeart/2005/8/quickstyle/simple1">
+  <dgm:title val=""/>
+  <dgm:desc val=""/>
+  <dgm:catLst>
+    <dgm:cat type="simple" pri="10100"/>
+  </dgm:catLst>
+  <dgm:scene3d>
+    <a:camera prst="orthographicFront"/>
+    <a:lightRig rig="threePt" dir="t"/>
+  </dgm:scene3d>
+  <dgm:styleLbl name="node0">
+    <dgm:scene3d>
+      <a:camera prst="orthographicFront"/>
+      <a:lightRig rig="threePt" dir="t"/>
+    </dgm:scene3d>
+    <dgm:sp3d/>
+    <dgm:txPr/>
+    <dgm:style>
+      <a:lnRef idx="2">
+        <a:scrgbClr r="0" g="0" b="0"/>
+      </a:lnRef>
+      <a:fillRef idx="1">
+        <a:scrgbClr r="0" g="0" b="0"/>
+      </a:fillRef>
+      <a:effectRef idx="0">
+        <a:scrgbClr r="0" g="0" b="0"/>
+      </a:effectRef>
+      <a:fontRef idx="minor">
+        <a:schemeClr val="lt1"/>
+      </a:fontRef>
+    </dgm:style>
+  </dgm:styleLbl>
+  <dgm:styleLbl name="lnNode1">
+    <dgm:scene3d>
+      <a:camera prst="orthographicFront"/>
+      <a:lightRig rig="threePt" dir="t"/>
+    </dgm:scene3d>
+    <dgm:sp3d/>
+    <dgm:txPr/>
+    <dgm:style>
+      <a:lnRef idx="2">
+        <a:scrgbClr r="0" g="0" b="0"/>
+      </a:lnRef>
+      <a:fillRef idx="1">
+        <a:scrgbClr r="0" g="0" b="0"/>
+      </a:fillRef>
+      <a:effectRef idx="0">
+        <a:scrgbClr r="0" g="0" b="0"/>
+      </a:effectRef>
+      <a:fontRef idx="minor">
+        <a:schemeClr val="lt1"/>
+      </a:fontRef>
+    </dgm:style>
+  </dgm:styleLbl>
+  <dgm:styleLbl name="vennNode1">
+    <dgm:scene3d>
+      <a:camera prst="orthographicFront"/>
+      <a:lightRig rig="threePt" dir="t"/>
+    </dgm:scene3d>
+    <dgm:sp3d/>
+    <dgm:txPr/>
+    <dgm:style>
+      <a:lnRef idx="2">
+        <a:scrgbClr r="0" g="0" b="0"/>
+      </a:lnRef>
+      <a:fillRef idx="1">
+        <a:scrgbClr r="0" g="0" b="0"/>
+      </a:fillRef>
+      <a:effectRef idx="0">
+        <a:scrgbClr r="0" g="0" b="0"/>
+      </a:effectRef>
+      <a:fontRef idx="minor">
+        <a:schemeClr val="tx1"/>
+      </a:fontRef>
+    </dgm:style>
+  </dgm:styleLbl>
+  <dgm:styleLbl name="alignNode1">
+    <dgm:scene3d>
+      <a:camera prst="orthographicFront"/>
+      <a:lightRig rig="threePt" dir="t"/>
+    </dgm:scene3d>
+    <dgm:sp3d/>
+    <dgm:txPr/>
+    <dgm:style>
+      <a:lnRef idx="2">
+        <a:scrgbClr r="0" g="0" b="0"/>
+      </a:lnRef>
+      <a:fillRef idx="1">
+        <a:scrgbClr r="0" g="0" b="0"/>
+      </a:fillRef>
+      <a:effectRef idx="0">
+        <a:scrgbClr r="0" g="0" b="0"/>
+      </a:effectRef>
+      <a:fontRef idx="minor">
+        <a:schemeClr val="lt1"/>
+      </a:fontRef>
+    </dgm:style>
+  </dgm:styleLbl>
+  <dgm:styleLbl name="node1">
+    <dgm:scene3d>
+      <a:camera prst="orthographicFront"/>
+      <a:lightRig rig="threePt" dir="t"/>
+    </dgm:scene3d>
+    <dgm:sp3d/>
+    <dgm:txPr/>
+    <dgm:style>
+      <a:lnRef idx="2">
+        <a:scrgbClr r="0" g="0" b="0"/>
+      </a:lnRef>
+      <a:fillRef idx="1">
+        <a:scrgbClr r="0" g="0" b="0"/>
+      </a:fillRef>
+      <a:effectRef idx="0">
+        <a:scrgbClr r="0" g="0" b="0"/>
+      </a:effectRef>
+      <a:fontRef idx="minor">
+        <a:schemeClr val="lt1"/>
+      </a:fontRef>
+    </dgm:style>
+  </dgm:styleLbl>
+  <dgm:styleLbl name="node2">
+    <dgm:scene3d>
+      <a:camera prst="orthographicFront"/>
+      <a:lightRig rig="threePt" dir="t"/>
+    </dgm:scene3d>
+    <dgm:sp3d/>
+    <dgm:txPr/>
+    <dgm:style>
+      <a:lnRef idx="2">
+        <a:scrgbClr r="0" g="0" b="0"/>
+      </a:lnRef>
+      <a:fillRef idx="1">
+        <a:scrgbClr r="0" g="0" b="0"/>
+      </a:fillRef>
+      <a:effectRef idx="0">
+        <a:scrgbClr r="0" g="0" b="0"/>
+      </a:effectRef>
+      <a:fontRef idx="minor">
+        <a:schemeClr val="lt1"/>
+      </a:fontRef>
+    </dgm:style>
+  </dgm:styleLbl>
+  <dgm:styleLbl name="node3">
+    <dgm:scene3d>
+      <a:camera prst="orthographicFront"/>
+      <a:lightRig rig="threePt" dir="t"/>
+    </dgm:scene3d>
+    <dgm:sp3d/>
+    <dgm:txPr/>
+    <dgm:style>
+      <a:lnRef idx="2">
+        <a:scrgbClr r="0" g="0" b="0"/>
+      </a:lnRef>
+      <a:fillRef idx="1">
+        <a:scrgbClr r="0" g="0" b="0"/>
+      </a:fillRef>
+      <a:effectRef idx="0">
+        <a:scrgbClr r="0" g="0" b="0"/>
+      </a:effectRef>
+      <a:fontRef idx="minor">
+        <a:schemeClr val="lt1"/>
+      </a:fontRef>
+    </dgm:style>
+  </dgm:styleLbl>
+  <dgm:styleLbl name="node4">
+    <dgm:scene3d>
+      <a:camera prst="orthographicFront"/>
+      <a:lightRig rig="threePt" dir="t"/>
+    </dgm:scene3d>
+    <dgm:sp3d/>
+    <dgm:txPr/>
+    <dgm:style>
+      <a:lnRef idx="2">
+        <a:scrgbClr r="0" g="0" b="0"/>
+      </a:lnRef>
+      <a:fillRef idx="1">
+        <a:scrgbClr r="0" g="0" b="0"/>
+      </a:fillRef>
+      <a:effectRef idx="0">
+        <a:scrgbClr r="0" g="0" b="0"/>
+      </a:effectRef>
+      <a:fontRef idx="minor">
+        <a:schemeClr val="lt1"/>
+      </a:fontRef>
+    </dgm:style>
+  </dgm:styleLbl>
+  <dgm:styleLbl name="fgImgPlace1">
+    <dgm:scene3d>
+      <a:camera prst="orthographicFront"/>
+      <a:lightRig rig="threePt" dir="t"/>
+    </dgm:scene3d>
+    <dgm:sp3d/>
+    <dgm:txPr/>
+    <dgm:style>
+      <a:lnRef idx="2">
+        <a:scrgbClr r="0" g="0" b="0"/>
+      </a:lnRef>
+      <a:fillRef idx="1">
+        <a:scrgbClr r="0" g="0" b="0"/>
+      </a:fillRef>
+      <a:effectRef idx="0">
+        <a:scrgbClr r="0" g="0" b="0"/>
+      </a:effectRef>
+      <a:fontRef idx="minor"/>
+    </dgm:style>
+  </dgm:styleLbl>
+  <dgm:styleLbl name="alignImgPlace1">
+    <dgm:scene3d>
+      <a:camera prst="orthographicFront"/>
+      <a:lightRig rig="threePt" dir="t"/>
+    </dgm:scene3d>
+    <dgm:sp3d/>
+    <dgm:txPr/>
+    <dgm:style>
+      <a:lnRef idx="2">
+        <a:scrgbClr r="0" g="0" b="0"/>
+      </a:lnRef>
+      <a:fillRef idx="1">
+        <a:scrgbClr r="0" g="0" b="0"/>
+      </a:fillRef>
+      <a:effectRef idx="0">
+        <a:scrgbClr r="0" g="0" b="0"/>
+      </a:effectRef>
+      <a:fontRef idx="minor"/>
+    </dgm:style>
+  </dgm:styleLbl>
+  <dgm:styleLbl name="bgImgPlace1">
+    <dgm:scene3d>
+      <a:camera prst="orthographicFront"/>
+      <a:lightRig rig="threePt" dir="t"/>
+    </dgm:scene3d>
+    <dgm:sp3d/>
+    <dgm:txPr/>
+    <dgm:style>
+      <a:lnRef idx="2">
+        <a:scrgbClr r="0" g="0" b="0"/>
+      </a:lnRef>
+      <a:fillRef idx="1">
+        <a:scrgbClr r="0" g="0" b="0"/>
+      </a:fillRef>
+      <a:effectRef idx="0">
+        <a:scrgbClr r="0" g="0" b="0"/>
+      </a:effectRef>
+      <a:fontRef idx="minor"/>
+    </dgm:style>
+  </dgm:styleLbl>
+  <dgm:styleLbl name="sibTrans2D1">
+    <dgm:scene3d>
+      <a:camera prst="orthographicFront"/>
+      <a:lightRig rig="threePt" dir="t"/>
+    </dgm:scene3d>
+    <dgm:sp3d/>
+    <dgm:txPr/>
+    <dgm:style>
+      <a:lnRef idx="0">
+        <a:scrgbClr r="0" g="0" b="0"/>
+      </a:lnRef>
+      <a:fillRef idx="1">
+        <a:scrgbClr r="0" g="0" b="0"/>
+      </a:fillRef>
+      <a:effectRef idx="0">
+        <a:scrgbClr r="0" g="0" b="0"/>
+      </a:effectRef>
+      <a:fontRef idx="minor">
+        <a:schemeClr val="lt1"/>
+      </a:fontRef>
+    </dgm:style>
+  </dgm:styleLbl>
+  <dgm:styleLbl name="fgSibTrans2D1">
+    <dgm:scene3d>
+      <a:camera prst="orthographicFront"/>
+      <a:lightRig rig="threePt" dir="t"/>
+    </dgm:scene3d>
+    <dgm:sp3d/>
+    <dgm:txPr/>
+    <dgm:style>
+      <a:lnRef idx="0">
+        <a:scrgbClr r="0" g="0" b="0"/>
+      </a:lnRef>
+      <a:fillRef idx="1">
+        <a:scrgbClr r="0" g="0" b="0"/>
+      </a:fillRef>
+      <a:effectRef idx="0">
+        <a:scrgbClr r="0" g="0" b="0"/>
+      </a:effectRef>
+      <a:fontRef idx="minor">
+        <a:schemeClr val="lt1"/>
+      </a:fontRef>
+    </dgm:style>
+  </dgm:styleLbl>
+  <dgm:styleLbl name="bgSibTrans2D1">
+    <dgm:scene3d>
+      <a:camera prst="orthographicFront"/>
+      <a:lightRig rig="threePt" dir="t"/>
+    </dgm:scene3d>
+    <dgm:sp3d/>
+    <dgm:txPr/>
+    <dgm:style>
+      <a:lnRef idx="0">
+        <a:scrgbClr r="0" g="0" b="0"/>
+      </a:lnRef>
+      <a:fillRef idx="1">
+        <a:scrgbClr r="0" g="0" b="0"/>
+      </a:fillRef>
+      <a:effectRef idx="0">
+        <a:scrgbClr r="0" g="0" b="0"/>
+      </a:effectRef>
+      <a:fontRef idx="minor">
+        <a:schemeClr val="lt1"/>
+      </a:fontRef>
+    </dgm:style>
+  </dgm:styleLbl>
+  <dgm:styleLbl name="sibTrans1D1">
+    <dgm:scene3d>
+      <a:camera prst="orthographicFront"/>
+      <a:lightRig rig="threePt" dir="t"/>
+    </dgm:scene3d>
+    <dgm:sp3d/>
+    <dgm:txPr/>
+    <dgm:style>
+      <a:lnRef idx="1">
+        <a:scrgbClr r="0" g="0" b="0"/>
+      </a:lnRef>
+      <a:fillRef idx="0">
+        <a:scrgbClr r="0" g="0" b="0"/>
+      </a:fillRef>
+      <a:effectRef idx="0">
+        <a:scrgbClr r="0" g="0" b="0"/>
+      </a:effectRef>
+      <a:fontRef idx="minor"/>
+    </dgm:style>
+  </dgm:styleLbl>
+  <dgm:styleLbl name="callout">
+    <dgm:scene3d>
+      <a:camera prst="orthographicFront"/>
+      <a:lightRig rig="threePt" dir="t"/>
+    </dgm:scene3d>
+    <dgm:sp3d/>
+    <dgm:txPr/>
+    <dgm:style>
+      <a:lnRef idx="2">
+        <a:scrgbClr r="0" g="0" b="0"/>
+      </a:lnRef>
+      <a:fillRef idx="1">
+        <a:scrgbClr r="0" g="0" b="0"/>
+      </a:fillRef>
+      <a:effectRef idx="0">
+        <a:scrgbClr r="0" g="0" b="0"/>
+      </a:effectRef>
+      <a:fontRef idx="minor"/>
+    </dgm:style>
+  </dgm:styleLbl>
+  <dgm:styleLbl name="asst0">
+    <dgm:scene3d>
+      <a:camera prst="orthographicFront"/>
+      <a:lightRig rig="threePt" dir="t"/>
+    </dgm:scene3d>
+    <dgm:sp3d/>
+    <dgm:txPr/>
+    <dgm:style>
+      <a:lnRef idx="2">
+        <a:scrgbClr r="0" g="0" b="0"/>
+      </a:lnRef>
+      <a:fillRef idx="1">
+        <a:scrgbClr r="0" g="0" b="0"/>
+      </a:fillRef>
+      <a:effectRef idx="0">
+        <a:scrgbClr r="0" g="0" b="0"/>
+      </a:effectRef>
+      <a:fontRef idx="minor">
+        <a:schemeClr val="lt1"/>
+      </a:fontRef>
+    </dgm:style>
+  </dgm:styleLbl>
+  <dgm:styleLbl name="asst1">
+    <dgm:scene3d>
+      <a:camera prst="orthographicFront"/>
+      <a:lightRig rig="threePt" dir="t"/>
+    </dgm:scene3d>
+    <dgm:sp3d/>
+    <dgm:txPr/>
+    <dgm:style>
+      <a:lnRef idx="2">
+        <a:scrgbClr r="0" g="0" b="0"/>
+      </a:lnRef>
+      <a:fillRef idx="1">
+        <a:scrgbClr r="0" g="0" b="0"/>
+      </a:fillRef>
+      <a:effectRef idx="0">
+        <a:scrgbClr r="0" g="0" b="0"/>
+      </a:effectRef>
+      <a:fontRef idx="minor">
+        <a:schemeClr val="lt1"/>
+      </a:fontRef>
+    </dgm:style>
+  </dgm:styleLbl>
+  <dgm:styleLbl name="asst2">
+    <dgm:scene3d>
+      <a:camera prst="orthographicFront"/>
+      <a:lightRig rig="threePt" dir="t"/>
+    </dgm:scene3d>
+    <dgm:sp3d/>
+    <dgm:txPr/>
+    <dgm:style>
+      <a:lnRef idx="2">
+        <a:scrgbClr r="0" g="0" b="0"/>
+      </a:lnRef>
+      <a:fillRef idx="1">
+        <a:scrgbClr r="0" g="0" b="0"/>
+      </a:fillRef>
+      <a:effectRef idx="0">
+        <a:scrgbClr r="0" g="0" b="0"/>
+      </a:effectRef>
+      <a:fontRef idx="minor">
+        <a:schemeClr val="lt1"/>
+      </a:fontRef>
+    </dgm:style>
+  </dgm:styleLbl>
+  <dgm:styleLbl name="asst3">
+    <dgm:scene3d>
+      <a:camera prst="orthographicFront"/>
+      <a:lightRig rig="threePt" dir="t"/>
+    </dgm:scene3d>
+    <dgm:sp3d/>
+    <dgm:txPr/>
+    <dgm:style>
+      <a:lnRef idx="2">
+        <a:scrgbClr r="0" g="0" b="0"/>
+      </a:lnRef>
+      <a:fillRef idx="1">
+        <a:scrgbClr r="0" g="0" b="0"/>
+      </a:fillRef>
+      <a:effectRef idx="0">
+        <a:scrgbClr r="0" g="0" b="0"/>
+      </a:effectRef>
+      <a:fontRef idx="minor">
+        <a:schemeClr val="lt1"/>
+      </a:fontRef>
+    </dgm:style>
+  </dgm:styleLbl>
+  <dgm:styleLbl name="asst4">
+    <dgm:scene3d>
+      <a:camera prst="orthographicFront"/>
+      <a:lightRig rig="threePt" dir="t"/>
+    </dgm:scene3d>
+    <dgm:sp3d/>
+    <dgm:txPr/>
+    <dgm:style>
+      <a:lnRef idx="2">
+        <a:scrgbClr r="0" g="0" b="0"/>
+      </a:lnRef>
+      <a:fillRef idx="1">
+        <a:scrgbClr r="0" g="0" b="0"/>
+      </a:fillRef>
+      <a:effectRef idx="0">
+        <a:scrgbClr r="0" g="0" b="0"/>
+      </a:effectRef>
+      <a:fontRef idx="minor">
+        <a:schemeClr val="lt1"/>
+      </a:fontRef>
+    </dgm:style>
+  </dgm:styleLbl>
+  <dgm:styleLbl name="parChTrans2D1">
+    <dgm:scene3d>
+      <a:camera prst="orthographicFront"/>
+      <a:lightRig rig="threePt" dir="t"/>
+    </dgm:scene3d>
+    <dgm:sp3d/>
+    <dgm:txPr/>
+    <dgm:style>
+      <a:lnRef idx="2">
+        <a:scrgbClr r="0" g="0" b="0"/>
+      </a:lnRef>
+      <a:fillRef idx="1">
+        <a:scrgbClr r="0" g="0" b="0"/>
+      </a:fillRef>
+      <a:effectRef idx="0">
+        <a:scrgbClr r="0" g="0" b="0"/>
+      </a:effectRef>
+      <a:fontRef idx="minor">
+        <a:schemeClr val="lt1"/>
+      </a:fontRef>
+    </dgm:style>
+  </dgm:styleLbl>
+  <dgm:styleLbl name="parChTrans2D2">
+    <dgm:scene3d>
+      <a:camera prst="orthographicFront"/>
+      <a:lightRig rig="threePt" dir="t"/>
+    </dgm:scene3d>
+    <dgm:sp3d/>
+    <dgm:txPr/>
+    <dgm:style>
+      <a:lnRef idx="2">
+        <a:scrgbClr r="0" g="0" b="0"/>
+      </a:lnRef>
+      <a:fillRef idx="1">
+        <a:scrgbClr r="0" g="0" b="0"/>
+      </a:fillRef>
+      <a:effectRef idx="0">
+        <a:scrgbClr r="0" g="0" b="0"/>
+      </a:effectRef>
+      <a:fontRef idx="minor">
+        <a:schemeClr val="lt1"/>
+      </a:fontRef>
+    </dgm:style>
+  </dgm:styleLbl>
+  <dgm:styleLbl name="parChTrans2D3">
+    <dgm:scene3d>
+      <a:camera prst="orthographicFront"/>
+      <a:lightRig rig="threePt" dir="t"/>
+    </dgm:scene3d>
+    <dgm:sp3d/>
+    <dgm:txPr/>
+    <dgm:style>
+      <a:lnRef idx="2">
+        <a:scrgbClr r="0" g="0" b="0"/>
+      </a:lnRef>
+      <a:fillRef idx="1">
+        <a:scrgbClr r="0" g="0" b="0"/>
+      </a:fillRef>
+      <a:effectRef idx="0">
+        <a:scrgbClr r="0" g="0" b="0"/>
+      </a:effectRef>
+      <a:fontRef idx="minor">
+        <a:schemeClr val="lt1"/>
+      </a:fontRef>
+    </dgm:style>
+  </dgm:styleLbl>
+  <dgm:styleLbl name="parChTrans2D4">
+    <dgm:scene3d>
+      <a:camera prst="orthographicFront"/>
+      <a:lightRig rig="threePt" dir="t"/>
+    </dgm:scene3d>
+    <dgm:sp3d/>
+    <dgm:txPr/>
+    <dgm:style>
+      <a:lnRef idx="2">
+        <a:scrgbClr r="0" g="0" b="0"/>
+      </a:lnRef>
+      <a:fillRef idx="1">
+        <a:scrgbClr r="0" g="0" b="0"/>
+      </a:fillRef>
+      <a:effectRef idx="0">
+        <a:scrgbClr r="0" g="0" b="0"/>
+      </a:effectRef>
+      <a:fontRef idx="minor">
+        <a:schemeClr val="lt1"/>
+      </a:fontRef>
+    </dgm:style>
+  </dgm:styleLbl>
+  <dgm:styleLbl name="parChTrans1D1">
+    <dgm:scene3d>
+      <a:camera prst="orthographicFront"/>
+      <a:lightRig rig="threePt" dir="t"/>
+    </dgm:scene3d>
+    <dgm:sp3d/>
+    <dgm:txPr/>
+    <dgm:style>
+      <a:lnRef idx="2">
+        <a:scrgbClr r="0" g="0" b="0"/>
+      </a:lnRef>
+      <a:fillRef idx="0">
+        <a:scrgbClr r="0" g="0" b="0"/>
+      </a:fillRef>
+      <a:effectRef idx="0">
+        <a:scrgbClr r="0" g="0" b="0"/>
+      </a:effectRef>
+      <a:fontRef idx="minor"/>
+    </dgm:style>
+  </dgm:styleLbl>
+  <dgm:styleLbl name="parChTrans1D2">
+    <dgm:scene3d>
+      <a:camera prst="orthographicFront"/>
+      <a:lightRig rig="threePt" dir="t"/>
+    </dgm:scene3d>
+    <dgm:sp3d/>
+    <dgm:txPr/>
+    <dgm:style>
+      <a:lnRef idx="2">
+        <a:scrgbClr r="0" g="0" b="0"/>
+      </a:lnRef>
+      <a:fillRef idx="0">
+        <a:scrgbClr r="0" g="0" b="0"/>
+      </a:fillRef>
+      <a:effectRef idx="0">
+        <a:scrgbClr r="0" g="0" b="0"/>
+      </a:effectRef>
+      <a:fontRef idx="minor"/>
+    </dgm:style>
+  </dgm:styleLbl>
+  <dgm:styleLbl name="parChTrans1D3">
+    <dgm:scene3d>
+      <a:camera prst="orthographicFront"/>
+      <a:lightRig rig="threePt" dir="t"/>
+    </dgm:scene3d>
+    <dgm:sp3d/>
+    <dgm:txPr/>
+    <dgm:style>
+      <a:lnRef idx="2">
+        <a:scrgbClr r="0" g="0" b="0"/>
+      </a:lnRef>
+      <a:fillRef idx="0">
+        <a:scrgbClr r="0" g="0" b="0"/>
+      </a:fillRef>
+      <a:effectRef idx="0">
+        <a:scrgbClr r="0" g="0" b="0"/>
+      </a:effectRef>
+      <a:fontRef idx="minor"/>
+    </dgm:style>
+  </dgm:styleLbl>
+  <dgm:styleLbl name="parChTrans1D4">
+    <dgm:scene3d>
+      <a:camera prst="orthographicFront"/>
+      <a:lightRig rig="threePt" dir="t"/>
+    </dgm:scene3d>
+    <dgm:sp3d/>
+    <dgm:txPr/>
+    <dgm:style>
+      <a:lnRef idx="2">
+        <a:scrgbClr r="0" g="0" b="0"/>
+      </a:lnRef>
+      <a:fillRef idx="0">
+        <a:scrgbClr r="0" g="0" b="0"/>
+      </a:fillRef>
+      <a:effectRef idx="0">
+        <a:scrgbClr r="0" g="0" b="0"/>
+      </a:effectRef>
+      <a:fontRef idx="minor"/>
+    </dgm:style>
+  </dgm:styleLbl>
+  <dgm:styleLbl name="fgAcc1">
+    <dgm:scene3d>
+      <a:camera prst="orthographicFront"/>
+      <a:lightRig rig="threePt" dir="t"/>
+    </dgm:scene3d>
+    <dgm:sp3d/>
+    <dgm:txPr/>
+    <dgm:style>
+      <a:lnRef idx="2">
+        <a:scrgbClr r="0" g="0" b="0"/>
+      </a:lnRef>
+      <a:fillRef idx="1">
+        <a:scrgbClr r="0" g="0" b="0"/>
+      </a:fillRef>
+      <a:effectRef idx="0">
+        <a:scrgbClr r="0" g="0" b="0"/>
+      </a:effectRef>
+      <a:fontRef idx="minor"/>
+    </dgm:style>
+  </dgm:styleLbl>
+  <dgm:styleLbl name="conFgAcc1">
+    <dgm:scene3d>
+      <a:camera prst="orthographicFront"/>
+      <a:lightRig rig="threePt" dir="t"/>
+    </dgm:scene3d>
+    <dgm:sp3d/>
+    <dgm:txPr/>
+    <dgm:style>
+      <a:lnRef idx="2">
+        <a:scrgbClr r="0" g="0" b="0"/>
+      </a:lnRef>
+      <a:fillRef idx="1">
+        <a:scrgbClr r="0" g="0" b="0"/>
+      </a:fillRef>
+      <a:effectRef idx="0">
+        <a:scrgbClr r="0" g="0" b="0"/>
+      </a:effectRef>
+      <a:fontRef idx="minor"/>
+    </dgm:style>
+  </dgm:styleLbl>
+  <dgm:styleLbl name="alignAcc1">
+    <dgm:scene3d>
+      <a:camera prst="orthographicFront"/>
+      <a:lightRig rig="threePt" dir="t"/>
+    </dgm:scene3d>
+    <dgm:sp3d/>
+    <dgm:txPr/>
+    <dgm:style>
+      <a:lnRef idx="2">
+        <a:scrgbClr r="0" g="0" b="0"/>
+      </a:lnRef>
+      <a:fillRef idx="1">
+        <a:scrgbClr r="0" g="0" b="0"/>
+      </a:fillRef>
+      <a:effectRef idx="0">
+        <a:scrgbClr r="0" g="0" b="0"/>
+      </a:effectRef>
+      <a:fontRef idx="minor"/>
+    </dgm:style>
+  </dgm:styleLbl>
+  <dgm:styleLbl name="trAlignAcc1">
+    <dgm:scene3d>
+      <a:camera prst="orthographicFront"/>
+      <a:lightRig rig="threePt" dir="t"/>
+    </dgm:scene3d>
+    <dgm:sp3d/>
+    <dgm:txPr/>
+    <dgm:style>
+      <a:lnRef idx="1">
+        <a:scrgbClr r="0" g="0" b="0"/>
+      </a:lnRef>
+      <a:fillRef idx="1">
+        <a:scrgbClr r="0" g="0" b="0"/>
+      </a:fillRef>
+      <a:effectRef idx="0">
+        <a:scrgbClr r="0" g="0" b="0"/>
+      </a:effectRef>
+      <a:fontRef idx="minor"/>
+    </dgm:style>
+  </dgm:styleLbl>
+  <dgm:styleLbl name="bgAcc1">
+    <dgm:scene3d>
+      <a:camera prst="orthographicFront"/>
+      <a:lightRig rig="threePt" dir="t"/>
+    </dgm:scene3d>
+    <dgm:sp3d/>
+    <dgm:txPr/>
+    <dgm:style>
+      <a:lnRef idx="2">
+        <a:scrgbClr r="0" g="0" b="0"/>
+      </a:lnRef>
+      <a:fillRef idx="1">
+        <a:scrgbClr r="0" g="0" b="0"/>
+      </a:fillRef>
+      <a:effectRef idx="0">
+        <a:scrgbClr r="0" g="0" b="0"/>
+      </a:effectRef>
+      <a:fontRef idx="minor"/>
+    </dgm:style>
+  </dgm:styleLbl>
+  <dgm:styleLbl name="solidFgAcc1">
+    <dgm:scene3d>
+      <a:camera prst="orthographicFront"/>
+      <a:lightRig rig="threePt" dir="t"/>
+    </dgm:scene3d>
+    <dgm:sp3d/>
+    <dgm:txPr/>
+    <dgm:style>
+      <a:lnRef idx="2">
+        <a:scrgbClr r="0" g="0" b="0"/>
+      </a:lnRef>
+      <a:fillRef idx="1">
+        <a:scrgbClr r="0" g="0" b="0"/>
+      </a:fillRef>
+      <a:effectRef idx="0">
+        <a:scrgbClr r="0" g="0" b="0"/>
+      </a:effectRef>
+      <a:fontRef idx="minor"/>
+    </dgm:style>
+  </dgm:styleLbl>
+  <dgm:styleLbl name="solidAlignAcc1">
+    <dgm:scene3d>
+      <a:camera prst="orthographicFront"/>
+      <a:lightRig rig="threePt" dir="t"/>
+    </dgm:scene3d>
+    <dgm:sp3d/>
+    <dgm:txPr/>
+    <dgm:style>
+      <a:lnRef idx="2">
+        <a:scrgbClr r="0" g="0" b="0"/>
+      </a:lnRef>
+      <a:fillRef idx="1">
+        <a:scrgbClr r="0" g="0" b="0"/>
+      </a:fillRef>
+      <a:effectRef idx="0">
+        <a:scrgbClr r="0" g="0" b="0"/>
+      </a:effectRef>
+      <a:fontRef idx="minor"/>
+    </dgm:style>
+  </dgm:styleLbl>
+  <dgm:styleLbl name="solidBgAcc1">
+    <dgm:scene3d>
+      <a:camera prst="orthographicFront"/>
+      <a:lightRig rig="threePt" dir="t"/>
+    </dgm:scene3d>
+    <dgm:sp3d/>
+    <dgm:txPr/>
+    <dgm:style>
+      <a:lnRef idx="2">
+        <a:scrgbClr r="0" g="0" b="0"/>
+      </a:lnRef>
+      <a:fillRef idx="1">
+        <a:scrgbClr r="0" g="0" b="0"/>
+      </a:fillRef>
+      <a:effectRef idx="0">
+        <a:scrgbClr r="0" g="0" b="0"/>
+      </a:effectRef>
+      <a:fontRef idx="minor"/>
+    </dgm:style>
+  </dgm:styleLbl>
+  <dgm:styleLbl name="fgAccFollowNode1">
+    <dgm:scene3d>
+      <a:camera prst="orthographicFront"/>
+      <a:lightRig rig="threePt" dir="t"/>
+    </dgm:scene3d>
+    <dgm:sp3d/>
+    <dgm:txPr/>
+    <dgm:style>
+      <a:lnRef idx="2">
+        <a:scrgbClr r="0" g="0" b="0"/>
+      </a:lnRef>
+      <a:fillRef idx="1">
+        <a:scrgbClr r="0" g="0" b="0"/>
+      </a:fillRef>
+      <a:effectRef idx="0">
+        <a:scrgbClr r="0" g="0" b="0"/>
+      </a:effectRef>
+      <a:fontRef idx="minor"/>
+    </dgm:style>
+  </dgm:styleLbl>
+  <dgm:styleLbl name="alignAccFollowNode1">
+    <dgm:scene3d>
+      <a:camera prst="orthographicFront"/>
+      <a:lightRig rig="threePt" dir="t"/>
+    </dgm:scene3d>
+    <dgm:sp3d/>
+    <dgm:txPr/>
+    <dgm:style>
+      <a:lnRef idx="2">
+        <a:scrgbClr r="0" g="0" b="0"/>
+      </a:lnRef>
+      <a:fillRef idx="1">
+        <a:scrgbClr r="0" g="0" b="0"/>
+      </a:fillRef>
+      <a:effectRef idx="0">
+        <a:scrgbClr r="0" g="0" b="0"/>
+      </a:effectRef>
+      <a:fontRef idx="minor"/>
+    </dgm:style>
+  </dgm:styleLbl>
+  <dgm:styleLbl name="bgAccFollowNode1">
+    <dgm:scene3d>
+      <a:camera prst="orthographicFront"/>
+      <a:lightRig rig="threePt" dir="t"/>
+    </dgm:scene3d>
+    <dgm:sp3d/>
+    <dgm:txPr/>
+    <dgm:style>
+      <a:lnRef idx="2">
+        <a:scrgbClr r="0" g="0" b="0"/>
+      </a:lnRef>
+      <a:fillRef idx="1">
+        <a:scrgbClr r="0" g="0" b="0"/>
+      </a:fillRef>
+      <a:effectRef idx="0">
+        <a:scrgbClr r="0" g="0" b="0"/>
+      </a:effectRef>
+      <a:fontRef idx="minor"/>
+    </dgm:style>
+  </dgm:styleLbl>
+  <dgm:styleLbl name="fgAcc0">
+    <dgm:scene3d>
+      <a:camera prst="orthographicFront"/>
+      <a:lightRig rig="threePt" dir="t"/>
+    </dgm:scene3d>
+    <dgm:sp3d/>
+    <dgm:txPr/>
+    <dgm:style>
+      <a:lnRef idx="2">
+        <a:scrgbClr r="0" g="0" b="0"/>
+      </a:lnRef>
+      <a:fillRef idx="1">
+        <a:scrgbClr r="0" g="0" b="0"/>
+      </a:fillRef>
+      <a:effectRef idx="0">
+        <a:scrgbClr r="0" g="0" b="0"/>
+      </a:effectRef>
+      <a:fontRef idx="minor"/>
+    </dgm:style>
+  </dgm:styleLbl>
+  <dgm:styleLbl name="fgAcc2">
+    <dgm:scene3d>
+      <a:camera prst="orthographicFront"/>
+      <a:lightRig rig="threePt" dir="t"/>
+    </dgm:scene3d>
+    <dgm:sp3d/>
+    <dgm:txPr/>
+    <dgm:style>
+      <a:lnRef idx="2">
+        <a:scrgbClr r="0" g="0" b="0"/>
+      </a:lnRef>
+      <a:fillRef idx="1">
+        <a:scrgbClr r="0" g="0" b="0"/>
+      </a:fillRef>
+      <a:effectRef idx="0">
+        <a:scrgbClr r="0" g="0" b="0"/>
+      </a:effectRef>
+      <a:fontRef idx="minor"/>
+    </dgm:style>
+  </dgm:styleLbl>
+  <dgm:styleLbl name="fgAcc3">
+    <dgm:scene3d>
+      <a:camera prst="orthographicFront"/>
+      <a:lightRig rig="threePt" dir="t"/>
+    </dgm:scene3d>
+    <dgm:sp3d/>
+    <dgm:txPr/>
+    <dgm:style>
+      <a:lnRef idx="2">
+        <a:scrgbClr r="0" g="0" b="0"/>
+      </a:lnRef>
+      <a:fillRef idx="1">
+        <a:scrgbClr r="0" g="0" b="0"/>
+      </a:fillRef>
+      <a:effectRef idx="0">
+        <a:scrgbClr r="0" g="0" b="0"/>
+      </a:effectRef>
+      <a:fontRef idx="minor"/>
+    </dgm:style>
+  </dgm:styleLbl>
+  <dgm:styleLbl name="fgAcc4">
+    <dgm:scene3d>
+      <a:camera prst="orthographicFront"/>
+      <a:lightRig rig="threePt" dir="t"/>
+    </dgm:scene3d>
+    <dgm:sp3d/>
+    <dgm:txPr/>
+    <dgm:style>
+      <a:lnRef idx="2">
+        <a:scrgbClr r="0" g="0" b="0"/>
+      </a:lnRef>
+      <a:fillRef idx="1">
+        <a:scrgbClr r="0" g="0" b="0"/>
+      </a:fillRef>
+      <a:effectRef idx="0">
+        <a:scrgbClr r="0" g="0" b="0"/>
+      </a:effectRef>
+      <a:fontRef idx="minor"/>
+    </dgm:style>
+  </dgm:styleLbl>
+  <dgm:styleLbl name="bgShp">
+    <dgm:scene3d>
+      <a:camera prst="orthographicFront"/>
+      <a:lightRig rig="threePt" dir="t"/>
+    </dgm:scene3d>
+    <dgm:sp3d/>
+    <dgm:txPr/>
+    <dgm:style>
+      <a:lnRef idx="0">
+        <a:scrgbClr r="0" g="0" b="0"/>
+      </a:lnRef>
+      <a:fillRef idx="1">
+        <a:scrgbClr r="0" g="0" b="0"/>
+      </a:fillRef>
+      <a:effectRef idx="0">
+        <a:scrgbClr r="0" g="0" b="0"/>
+      </a:effectRef>
+      <a:fontRef idx="minor"/>
+    </dgm:style>
+  </dgm:styleLbl>
+  <dgm:styleLbl name="dkBgShp">
+    <dgm:scene3d>
+      <a:camera prst="orthographicFront"/>
+      <a:lightRig rig="threePt" dir="t"/>
+    </dgm:scene3d>
+    <dgm:sp3d/>
+    <dgm:txPr/>
+    <dgm:style>
+      <a:lnRef idx="0">
+        <a:scrgbClr r="0" g="0" b="0"/>
+      </a:lnRef>
+      <a:fillRef idx="1">
+        <a:scrgbClr r="0" g="0" b="0"/>
+      </a:fillRef>
+      <a:effectRef idx="0">
+        <a:scrgbClr r="0" g="0" b="0"/>
+      </a:effectRef>
+      <a:fontRef idx="minor"/>
+    </dgm:style>
+  </dgm:styleLbl>
+  <dgm:styleLbl name="trBgShp">
+    <dgm:scene3d>
+      <a:camera prst="orthographicFront"/>
+      <a:lightRig rig="threePt" dir="t"/>
+    </dgm:scene3d>
+    <dgm:sp3d/>
+    <dgm:txPr/>
+    <dgm:style>
+      <a:lnRef idx="0">
+        <a:scrgbClr r="0" g="0" b="0"/>
+      </a:lnRef>
+      <a:fillRef idx="1">
+        <a:scrgbClr r="0" g="0" b="0"/>
+      </a:fillRef>
+      <a:effectRef idx="0">
+        <a:scrgbClr r="0" g="0" b="0"/>
+      </a:effectRef>
+      <a:fontRef idx="minor"/>
+    </dgm:style>
+  </dgm:styleLbl>
+  <dgm:styleLbl name="fgShp">
+    <dgm:scene3d>
+      <a:camera prst="orthographicFront"/>
+      <a:lightRig rig="threePt" dir="t"/>
+    </dgm:scene3d>
+    <dgm:sp3d/>
+    <dgm:txPr/>
+    <dgm:style>
+      <a:lnRef idx="2">
+        <a:scrgbClr r="0" g="0" b="0"/>
+      </a:lnRef>
+      <a:fillRef idx="1">
+        <a:scrgbClr r="0" g="0" b="0"/>
+      </a:fillRef>
+      <a:effectRef idx="0">
+        <a:scrgbClr r="0" g="0" b="0"/>
+      </a:effectRef>
+      <a:fontRef idx="minor"/>
+    </dgm:style>
+  </dgm:styleLbl>
+  <dgm:styleLbl name="revTx">
+    <dgm:scene3d>
+      <a:camera prst="orthographicFront"/>
+      <a:lightRig rig="threePt" dir="t"/>
+    </dgm:scene3d>
+    <dgm:sp3d/>
+    <dgm:txPr/>
+    <dgm:style>
+      <a:lnRef idx="0">
+        <a:scrgbClr r="0" g="0" b="0"/>
+      </a:lnRef>
+      <a:fillRef idx="0">
+        <a:scrgbClr r="0" g="0" b="0"/>
+      </a:fillRef>
+      <a:effectRef idx="0">
+        <a:scrgbClr r="0" g="0" b="0"/>
+      </a:effectRef>
+      <a:fontRef idx="minor"/>
+    </dgm:style>
+  </dgm:styleLbl>
+</dgm:styleDef>
+</file>
+
+<file path=ppt/diagrams/quickStyle8.xml><?xml version="1.0" encoding="utf-8"?>
 <dgm:styleDef xmlns:dgm="http://schemas.openxmlformats.org/drawingml/2006/diagram" xmlns:a="http://schemas.openxmlformats.org/drawingml/2006/main" uniqueId="urn:microsoft.com/office/officeart/2005/8/quickstyle/simple1">
   <dgm:title val=""/>
   <dgm:desc val=""/>
@@ -20673,6 +23741,90 @@
     <p:extLst>
       <p:ext uri="{BB962C8B-B14F-4D97-AF65-F5344CB8AC3E}">
         <p14:creationId xmlns:p14="http://schemas.microsoft.com/office/powerpoint/2010/main" val="639934125"/>
+      </p:ext>
+    </p:extLst>
+  </p:cSld>
+  <p:clrMapOvr>
+    <a:masterClrMapping/>
+  </p:clrMapOvr>
+</p:notes>
+</file>
+
+<file path=ppt/notesSlides/notesSlide6.xml><?xml version="1.0" encoding="utf-8"?>
+<p:notes xmlns:a="http://schemas.openxmlformats.org/drawingml/2006/main" xmlns:r="http://schemas.openxmlformats.org/officeDocument/2006/relationships" xmlns:p="http://schemas.openxmlformats.org/presentationml/2006/main">
+  <p:cSld>
+    <p:spTree>
+      <p:nvGrpSpPr>
+        <p:cNvPr id="1" name=""/>
+        <p:cNvGrpSpPr/>
+        <p:nvPr/>
+      </p:nvGrpSpPr>
+      <p:grpSpPr>
+        <a:xfrm>
+          <a:off x="0" y="0"/>
+          <a:ext cx="0" cy="0"/>
+          <a:chOff x="0" y="0"/>
+          <a:chExt cx="0" cy="0"/>
+        </a:xfrm>
+      </p:grpSpPr>
+      <p:sp>
+        <p:nvSpPr>
+          <p:cNvPr id="2" name="Folienbildplatzhalter 1"/>
+          <p:cNvSpPr>
+            <a:spLocks noGrp="1" noRot="1" noChangeAspect="1"/>
+          </p:cNvSpPr>
+          <p:nvPr>
+            <p:ph type="sldImg"/>
+          </p:nvPr>
+        </p:nvSpPr>
+        <p:spPr/>
+      </p:sp>
+      <p:sp>
+        <p:nvSpPr>
+          <p:cNvPr id="3" name="Notizenplatzhalter 2"/>
+          <p:cNvSpPr>
+            <a:spLocks noGrp="1"/>
+          </p:cNvSpPr>
+          <p:nvPr>
+            <p:ph type="body" idx="1"/>
+          </p:nvPr>
+        </p:nvSpPr>
+        <p:spPr/>
+        <p:txBody>
+          <a:bodyPr/>
+          <a:lstStyle/>
+          <a:p>
+            <a:endParaRPr lang="en-US" dirty="0"/>
+          </a:p>
+        </p:txBody>
+      </p:sp>
+      <p:sp>
+        <p:nvSpPr>
+          <p:cNvPr id="4" name="Foliennummernplatzhalter 3"/>
+          <p:cNvSpPr>
+            <a:spLocks noGrp="1"/>
+          </p:cNvSpPr>
+          <p:nvPr>
+            <p:ph type="sldNum" sz="quarter" idx="5"/>
+          </p:nvPr>
+        </p:nvSpPr>
+        <p:spPr/>
+        <p:txBody>
+          <a:bodyPr/>
+          <a:lstStyle/>
+          <a:p>
+            <a:fld id="{48844636-12E7-4AFF-A184-21179E60C766}" type="slidenum">
+              <a:rPr lang="en-US" smtClean="0"/>
+              <a:t>21</a:t>
+            </a:fld>
+            <a:endParaRPr lang="en-US"/>
+          </a:p>
+        </p:txBody>
+      </p:sp>
+    </p:spTree>
+    <p:extLst>
+      <p:ext uri="{BB962C8B-B14F-4D97-AF65-F5344CB8AC3E}">
+        <p14:creationId xmlns:p14="http://schemas.microsoft.com/office/powerpoint/2010/main" val="2653745131"/>
       </p:ext>
     </p:extLst>
   </p:cSld>
@@ -27313,6 +30465,240 @@
           <p:cNvPr id="2" name="Titel 1">
             <a:extLst>
               <a:ext uri="{FF2B5EF4-FFF2-40B4-BE49-F238E27FC236}">
+                <a16:creationId xmlns:a16="http://schemas.microsoft.com/office/drawing/2014/main" id="{5FD50107-9F42-4FD4-BA1C-76FA1DEBA51F}"/>
+              </a:ext>
+            </a:extLst>
+          </p:cNvPr>
+          <p:cNvSpPr>
+            <a:spLocks noGrp="1"/>
+          </p:cNvSpPr>
+          <p:nvPr>
+            <p:ph type="title"/>
+          </p:nvPr>
+        </p:nvSpPr>
+        <p:spPr/>
+        <p:txBody>
+          <a:bodyPr/>
+          <a:lstStyle/>
+          <a:p>
+            <a:r>
+              <a:rPr lang="de-DE" dirty="0"/>
+              <a:t>Level 8 – Story</a:t>
+            </a:r>
+            <a:r>
+              <a:rPr lang="de-DE" baseline="0" dirty="0"/>
+              <a:t> Time</a:t>
+            </a:r>
+            <a:endParaRPr lang="en-US" dirty="0"/>
+          </a:p>
+        </p:txBody>
+      </p:sp>
+      <p:sp>
+        <p:nvSpPr>
+          <p:cNvPr id="3" name="Inhaltsplatzhalter 2">
+            <a:extLst>
+              <a:ext uri="{FF2B5EF4-FFF2-40B4-BE49-F238E27FC236}">
+                <a16:creationId xmlns:a16="http://schemas.microsoft.com/office/drawing/2014/main" id="{01DC038D-0CE0-4FF4-98B1-FA922076CCE6}"/>
+              </a:ext>
+            </a:extLst>
+          </p:cNvPr>
+          <p:cNvSpPr>
+            <a:spLocks noGrp="1"/>
+          </p:cNvSpPr>
+          <p:nvPr>
+            <p:ph idx="1"/>
+          </p:nvPr>
+        </p:nvSpPr>
+        <p:spPr/>
+        <p:txBody>
+          <a:bodyPr/>
+          <a:lstStyle/>
+          <a:p>
+            <a:pPr marL="201168" lvl="1" indent="0">
+              <a:buNone/>
+            </a:pPr>
+            <a:r>
+              <a:rPr lang="de-DE" dirty="0"/>
+              <a:t>In</a:t>
+            </a:r>
+            <a:r>
+              <a:rPr lang="de-DE" baseline="0" dirty="0"/>
+              <a:t> den letzten Tagen und Wochen ist aus der Idee der </a:t>
+            </a:r>
+            <a:r>
+              <a:rPr lang="de-DE" baseline="0" dirty="0" err="1"/>
+              <a:t>BuggyBank</a:t>
+            </a:r>
+            <a:r>
+              <a:rPr lang="de-DE" baseline="0" dirty="0"/>
+              <a:t> AG schon eine ansehnliche</a:t>
+            </a:r>
+            <a:r>
+              <a:rPr lang="de-DE" dirty="0"/>
+              <a:t> Applikation entstanden. Der Vorstand ist von unserer Arbeit sehr angetan und möchte die Applikation nun weiterentwickeln.</a:t>
+            </a:r>
+          </a:p>
+          <a:p>
+            <a:pPr marL="201168" lvl="1" indent="0">
+              <a:buNone/>
+            </a:pPr>
+            <a:r>
+              <a:rPr lang="de-DE" dirty="0"/>
+              <a:t>Anstatt nur die Kundenbetreuer und Sachbearbeiter zu unterstützen, soll die Applikation nun zu einer vollwertigen Onlinebanking-Anwendung für die Kunden der </a:t>
+            </a:r>
+            <a:r>
+              <a:rPr lang="de-DE" dirty="0" err="1"/>
+              <a:t>BuggyBank</a:t>
+            </a:r>
+            <a:r>
+              <a:rPr lang="de-DE" dirty="0"/>
+              <a:t> AG werden. </a:t>
+            </a:r>
+          </a:p>
+          <a:p>
+            <a:pPr marL="201168" lvl="1" indent="0">
+              <a:buNone/>
+            </a:pPr>
+            <a:r>
+              <a:rPr lang="de-DE" dirty="0"/>
+              <a:t>Dazu sind in erster Linie Verbesserungen der graphischen Oberfläche notwendig, aber auch Erweiterungen an den gehaltenen Daten. Darüber hinaus müssen wir uns, wenn viele Kunden die Anwendung intuitiv und ohne Schulung nutzen können sollen, Gedanken um die Rückmeldungen bei Aktionen (ja, das hat funktioniert! Nein, es kam zu einem Fehler) machen. </a:t>
+            </a:r>
+          </a:p>
+        </p:txBody>
+      </p:sp>
+    </p:spTree>
+    <p:extLst>
+      <p:ext uri="{BB962C8B-B14F-4D97-AF65-F5344CB8AC3E}">
+        <p14:creationId xmlns:p14="http://schemas.microsoft.com/office/powerpoint/2010/main" val="3516315348"/>
+      </p:ext>
+    </p:extLst>
+  </p:cSld>
+  <p:clrMapOvr>
+    <a:masterClrMapping/>
+  </p:clrMapOvr>
+</p:sld>
+</file>
+
+<file path=ppt/slides/slide21.xml><?xml version="1.0" encoding="utf-8"?>
+<p:sld xmlns:a="http://schemas.openxmlformats.org/drawingml/2006/main" xmlns:r="http://schemas.openxmlformats.org/officeDocument/2006/relationships" xmlns:p="http://schemas.openxmlformats.org/presentationml/2006/main">
+  <p:cSld>
+    <p:spTree>
+      <p:nvGrpSpPr>
+        <p:cNvPr id="1" name=""/>
+        <p:cNvGrpSpPr/>
+        <p:nvPr/>
+      </p:nvGrpSpPr>
+      <p:grpSpPr>
+        <a:xfrm>
+          <a:off x="0" y="0"/>
+          <a:ext cx="0" cy="0"/>
+          <a:chOff x="0" y="0"/>
+          <a:chExt cx="0" cy="0"/>
+        </a:xfrm>
+      </p:grpSpPr>
+      <p:sp>
+        <p:nvSpPr>
+          <p:cNvPr id="2" name="Titel 1">
+            <a:extLst>
+              <a:ext uri="{FF2B5EF4-FFF2-40B4-BE49-F238E27FC236}">
+                <a16:creationId xmlns:a16="http://schemas.microsoft.com/office/drawing/2014/main" id="{193A6548-0E2B-479A-8D4F-16345DC3A106}"/>
+              </a:ext>
+            </a:extLst>
+          </p:cNvPr>
+          <p:cNvSpPr>
+            <a:spLocks noGrp="1"/>
+          </p:cNvSpPr>
+          <p:nvPr>
+            <p:ph type="title"/>
+          </p:nvPr>
+        </p:nvSpPr>
+        <p:spPr/>
+        <p:txBody>
+          <a:bodyPr/>
+          <a:lstStyle/>
+          <a:p>
+            <a:r>
+              <a:rPr lang="de-DE" dirty="0" err="1"/>
+              <a:t>Buggybank</a:t>
+            </a:r>
+            <a:r>
+              <a:rPr lang="de-DE" dirty="0"/>
+              <a:t> </a:t>
+            </a:r>
+            <a:r>
+              <a:rPr lang="de-DE" dirty="0" err="1"/>
+              <a:t>UseCases</a:t>
+            </a:r>
+            <a:endParaRPr lang="en-US" dirty="0"/>
+          </a:p>
+        </p:txBody>
+      </p:sp>
+      <p:graphicFrame>
+        <p:nvGraphicFramePr>
+          <p:cNvPr id="4" name="Inhaltsplatzhalter 3">
+            <a:extLst>
+              <a:ext uri="{FF2B5EF4-FFF2-40B4-BE49-F238E27FC236}">
+                <a16:creationId xmlns:a16="http://schemas.microsoft.com/office/drawing/2014/main" id="{E91691B7-5869-4846-802A-7FC2605D481F}"/>
+              </a:ext>
+            </a:extLst>
+          </p:cNvPr>
+          <p:cNvGraphicFramePr>
+            <a:graphicFrameLocks noGrp="1"/>
+          </p:cNvGraphicFramePr>
+          <p:nvPr>
+            <p:ph idx="1"/>
+            <p:extLst>
+              <p:ext uri="{D42A27DB-BD31-4B8C-83A1-F6EECF244321}">
+                <p14:modId xmlns:p14="http://schemas.microsoft.com/office/powerpoint/2010/main" val="1200010382"/>
+              </p:ext>
+            </p:extLst>
+          </p:nvPr>
+        </p:nvGraphicFramePr>
+        <p:xfrm>
+          <a:off x="1096963" y="1846263"/>
+          <a:ext cx="10058400" cy="4022725"/>
+        </p:xfrm>
+        <a:graphic>
+          <a:graphicData uri="http://schemas.openxmlformats.org/drawingml/2006/diagram">
+            <dgm:relIds xmlns:dgm="http://schemas.openxmlformats.org/drawingml/2006/diagram" xmlns:r="http://schemas.openxmlformats.org/officeDocument/2006/relationships" r:dm="rId3" r:lo="rId4" r:qs="rId5" r:cs="rId6"/>
+          </a:graphicData>
+        </a:graphic>
+      </p:graphicFrame>
+    </p:spTree>
+    <p:extLst>
+      <p:ext uri="{BB962C8B-B14F-4D97-AF65-F5344CB8AC3E}">
+        <p14:creationId xmlns:p14="http://schemas.microsoft.com/office/powerpoint/2010/main" val="2738433998"/>
+      </p:ext>
+    </p:extLst>
+  </p:cSld>
+  <p:clrMapOvr>
+    <a:masterClrMapping/>
+  </p:clrMapOvr>
+</p:sld>
+</file>
+
+<file path=ppt/slides/slide22.xml><?xml version="1.0" encoding="utf-8"?>
+<p:sld xmlns:a="http://schemas.openxmlformats.org/drawingml/2006/main" xmlns:r="http://schemas.openxmlformats.org/officeDocument/2006/relationships" xmlns:p="http://schemas.openxmlformats.org/presentationml/2006/main">
+  <p:cSld>
+    <p:spTree>
+      <p:nvGrpSpPr>
+        <p:cNvPr id="1" name=""/>
+        <p:cNvGrpSpPr/>
+        <p:nvPr/>
+      </p:nvGrpSpPr>
+      <p:grpSpPr>
+        <a:xfrm>
+          <a:off x="0" y="0"/>
+          <a:ext cx="0" cy="0"/>
+          <a:chOff x="0" y="0"/>
+          <a:chExt cx="0" cy="0"/>
+        </a:xfrm>
+      </p:grpSpPr>
+      <p:sp>
+        <p:nvSpPr>
+          <p:cNvPr id="2" name="Titel 1">
+            <a:extLst>
+              <a:ext uri="{FF2B5EF4-FFF2-40B4-BE49-F238E27FC236}">
                 <a16:creationId xmlns:a16="http://schemas.microsoft.com/office/drawing/2014/main" id="{2425F089-43FC-489E-9ADD-CB8D7AB88A16}"/>
               </a:ext>
             </a:extLst>
@@ -27390,7 +30776,7 @@
 </p:sld>
 </file>
 
-<file path=ppt/slides/slide21.xml><?xml version="1.0" encoding="utf-8"?>
+<file path=ppt/slides/slide23.xml><?xml version="1.0" encoding="utf-8"?>
 <p:sld xmlns:a="http://schemas.openxmlformats.org/drawingml/2006/main" xmlns:r="http://schemas.openxmlformats.org/officeDocument/2006/relationships" xmlns:p="http://schemas.openxmlformats.org/presentationml/2006/main">
   <p:cSld>
     <p:spTree>

</xml_diff>